<commit_message>
Feat: Resnet backbone 구현
Filename : resnet.py
</commit_message>
<xml_diff>
--- a/PPT/fishnet_understanding.pptx
+++ b/PPT/fishnet_understanding.pptx
@@ -7,6 +7,8 @@
   <p:sldIdLst>
     <p:sldId id="256" r:id="rId2"/>
     <p:sldId id="257" r:id="rId3"/>
+    <p:sldId id="259" r:id="rId4"/>
+    <p:sldId id="258" r:id="rId5"/>
   </p:sldIdLst>
   <p:sldSz cx="12192000" cy="6858000"/>
   <p:notesSz cx="6858000" cy="9144000"/>
@@ -271,7 +273,7 @@
           <a:p>
             <a:fld id="{42174FDF-3701-4CD0-BE4C-4BC2E26DCC5C}" type="datetimeFigureOut">
               <a:rPr lang="ko-KR" altLang="en-US" smtClean="0"/>
-              <a:t>2022-05-20</a:t>
+              <a:t>2022-05-23</a:t>
             </a:fld>
             <a:endParaRPr lang="ko-KR" altLang="en-US"/>
           </a:p>
@@ -469,7 +471,7 @@
           <a:p>
             <a:fld id="{42174FDF-3701-4CD0-BE4C-4BC2E26DCC5C}" type="datetimeFigureOut">
               <a:rPr lang="ko-KR" altLang="en-US" smtClean="0"/>
-              <a:t>2022-05-20</a:t>
+              <a:t>2022-05-23</a:t>
             </a:fld>
             <a:endParaRPr lang="ko-KR" altLang="en-US"/>
           </a:p>
@@ -677,7 +679,7 @@
           <a:p>
             <a:fld id="{42174FDF-3701-4CD0-BE4C-4BC2E26DCC5C}" type="datetimeFigureOut">
               <a:rPr lang="ko-KR" altLang="en-US" smtClean="0"/>
-              <a:t>2022-05-20</a:t>
+              <a:t>2022-05-23</a:t>
             </a:fld>
             <a:endParaRPr lang="ko-KR" altLang="en-US"/>
           </a:p>
@@ -875,7 +877,7 @@
           <a:p>
             <a:fld id="{42174FDF-3701-4CD0-BE4C-4BC2E26DCC5C}" type="datetimeFigureOut">
               <a:rPr lang="ko-KR" altLang="en-US" smtClean="0"/>
-              <a:t>2022-05-20</a:t>
+              <a:t>2022-05-23</a:t>
             </a:fld>
             <a:endParaRPr lang="ko-KR" altLang="en-US"/>
           </a:p>
@@ -1150,7 +1152,7 @@
           <a:p>
             <a:fld id="{42174FDF-3701-4CD0-BE4C-4BC2E26DCC5C}" type="datetimeFigureOut">
               <a:rPr lang="ko-KR" altLang="en-US" smtClean="0"/>
-              <a:t>2022-05-20</a:t>
+              <a:t>2022-05-23</a:t>
             </a:fld>
             <a:endParaRPr lang="ko-KR" altLang="en-US"/>
           </a:p>
@@ -1415,7 +1417,7 @@
           <a:p>
             <a:fld id="{42174FDF-3701-4CD0-BE4C-4BC2E26DCC5C}" type="datetimeFigureOut">
               <a:rPr lang="ko-KR" altLang="en-US" smtClean="0"/>
-              <a:t>2022-05-20</a:t>
+              <a:t>2022-05-23</a:t>
             </a:fld>
             <a:endParaRPr lang="ko-KR" altLang="en-US"/>
           </a:p>
@@ -1827,7 +1829,7 @@
           <a:p>
             <a:fld id="{42174FDF-3701-4CD0-BE4C-4BC2E26DCC5C}" type="datetimeFigureOut">
               <a:rPr lang="ko-KR" altLang="en-US" smtClean="0"/>
-              <a:t>2022-05-20</a:t>
+              <a:t>2022-05-23</a:t>
             </a:fld>
             <a:endParaRPr lang="ko-KR" altLang="en-US"/>
           </a:p>
@@ -1968,7 +1970,7 @@
           <a:p>
             <a:fld id="{42174FDF-3701-4CD0-BE4C-4BC2E26DCC5C}" type="datetimeFigureOut">
               <a:rPr lang="ko-KR" altLang="en-US" smtClean="0"/>
-              <a:t>2022-05-20</a:t>
+              <a:t>2022-05-23</a:t>
             </a:fld>
             <a:endParaRPr lang="ko-KR" altLang="en-US"/>
           </a:p>
@@ -2081,7 +2083,7 @@
           <a:p>
             <a:fld id="{42174FDF-3701-4CD0-BE4C-4BC2E26DCC5C}" type="datetimeFigureOut">
               <a:rPr lang="ko-KR" altLang="en-US" smtClean="0"/>
-              <a:t>2022-05-20</a:t>
+              <a:t>2022-05-23</a:t>
             </a:fld>
             <a:endParaRPr lang="ko-KR" altLang="en-US"/>
           </a:p>
@@ -2392,7 +2394,7 @@
           <a:p>
             <a:fld id="{42174FDF-3701-4CD0-BE4C-4BC2E26DCC5C}" type="datetimeFigureOut">
               <a:rPr lang="ko-KR" altLang="en-US" smtClean="0"/>
-              <a:t>2022-05-20</a:t>
+              <a:t>2022-05-23</a:t>
             </a:fld>
             <a:endParaRPr lang="ko-KR" altLang="en-US"/>
           </a:p>
@@ -2680,7 +2682,7 @@
           <a:p>
             <a:fld id="{42174FDF-3701-4CD0-BE4C-4BC2E26DCC5C}" type="datetimeFigureOut">
               <a:rPr lang="ko-KR" altLang="en-US" smtClean="0"/>
-              <a:t>2022-05-20</a:t>
+              <a:t>2022-05-23</a:t>
             </a:fld>
             <a:endParaRPr lang="ko-KR" altLang="en-US"/>
           </a:p>
@@ -2921,7 +2923,7 @@
           <a:p>
             <a:fld id="{42174FDF-3701-4CD0-BE4C-4BC2E26DCC5C}" type="datetimeFigureOut">
               <a:rPr lang="ko-KR" altLang="en-US" smtClean="0"/>
-              <a:t>2022-05-20</a:t>
+              <a:t>2022-05-23</a:t>
             </a:fld>
             <a:endParaRPr lang="ko-KR" altLang="en-US"/>
           </a:p>
@@ -3352,7 +3354,7 @@
         </p:nvSpPr>
         <p:spPr>
           <a:xfrm>
-            <a:off x="274890" y="402336"/>
+            <a:off x="4258626" y="967535"/>
             <a:ext cx="429768" cy="2622757"/>
           </a:xfrm>
           <a:prstGeom prst="rect">
@@ -3401,7 +3403,7 @@
         </p:nvSpPr>
         <p:spPr>
           <a:xfrm>
-            <a:off x="1682496" y="400336"/>
+            <a:off x="5666232" y="965535"/>
             <a:ext cx="429768" cy="1284058"/>
           </a:xfrm>
           <a:prstGeom prst="rect">
@@ -3450,7 +3452,7 @@
         </p:nvSpPr>
         <p:spPr>
           <a:xfrm>
-            <a:off x="2999780" y="400336"/>
+            <a:off x="6983516" y="965535"/>
             <a:ext cx="429768" cy="648859"/>
           </a:xfrm>
           <a:prstGeom prst="rect">
@@ -3499,7 +3501,7 @@
         </p:nvSpPr>
         <p:spPr>
           <a:xfrm>
-            <a:off x="133158" y="438912"/>
+            <a:off x="4116894" y="1004111"/>
             <a:ext cx="713232" cy="369332"/>
           </a:xfrm>
           <a:prstGeom prst="rect">
@@ -3535,7 +3537,7 @@
         </p:nvSpPr>
         <p:spPr>
           <a:xfrm>
-            <a:off x="1769364" y="438912"/>
+            <a:off x="5753100" y="1004111"/>
             <a:ext cx="342900" cy="369332"/>
           </a:xfrm>
           <a:prstGeom prst="rect">
@@ -3571,7 +3573,7 @@
         </p:nvSpPr>
         <p:spPr>
           <a:xfrm>
-            <a:off x="3127796" y="438912"/>
+            <a:off x="7111532" y="1004111"/>
             <a:ext cx="342900" cy="369332"/>
           </a:xfrm>
           <a:prstGeom prst="rect">
@@ -3607,7 +3609,7 @@
         </p:nvSpPr>
         <p:spPr>
           <a:xfrm>
-            <a:off x="5604750" y="400336"/>
+            <a:off x="9588486" y="965535"/>
             <a:ext cx="429768" cy="1284058"/>
           </a:xfrm>
           <a:prstGeom prst="rect">
@@ -3659,7 +3661,7 @@
         </p:nvSpPr>
         <p:spPr>
           <a:xfrm>
-            <a:off x="4069425" y="400336"/>
+            <a:off x="8053161" y="965535"/>
             <a:ext cx="429768" cy="648859"/>
           </a:xfrm>
           <a:prstGeom prst="rect">
@@ -3711,7 +3713,7 @@
         </p:nvSpPr>
         <p:spPr>
           <a:xfrm>
-            <a:off x="4159889" y="438912"/>
+            <a:off x="8143625" y="1004111"/>
             <a:ext cx="530352" cy="369332"/>
           </a:xfrm>
           <a:prstGeom prst="rect">
@@ -3747,7 +3749,7 @@
         </p:nvSpPr>
         <p:spPr>
           <a:xfrm>
-            <a:off x="5684668" y="438912"/>
+            <a:off x="9668404" y="1004111"/>
             <a:ext cx="342900" cy="369332"/>
           </a:xfrm>
           <a:prstGeom prst="rect">
@@ -3783,7 +3785,7 @@
         </p:nvSpPr>
         <p:spPr>
           <a:xfrm>
-            <a:off x="6488460" y="438912"/>
+            <a:off x="10472196" y="1004111"/>
             <a:ext cx="342900" cy="369332"/>
           </a:xfrm>
           <a:prstGeom prst="rect">
@@ -3819,7 +3821,7 @@
         </p:nvGrpSpPr>
         <p:grpSpPr>
           <a:xfrm>
-            <a:off x="8430591" y="561782"/>
+            <a:off x="100735" y="3411457"/>
             <a:ext cx="3575876" cy="480583"/>
             <a:chOff x="6756844" y="197739"/>
             <a:chExt cx="4039743" cy="542925"/>
@@ -3906,7 +3908,7 @@
         </p:nvSpPr>
         <p:spPr>
           <a:xfrm>
-            <a:off x="2381826" y="31004"/>
+            <a:off x="6365562" y="596203"/>
             <a:ext cx="713232" cy="369332"/>
           </a:xfrm>
           <a:prstGeom prst="rect">
@@ -3942,7 +3944,7 @@
         </p:nvSpPr>
         <p:spPr>
           <a:xfrm>
-            <a:off x="3718560" y="31004"/>
+            <a:off x="7702296" y="596203"/>
             <a:ext cx="713232" cy="369332"/>
           </a:xfrm>
           <a:prstGeom prst="rect">
@@ -3986,7 +3988,7 @@
         </p:blipFill>
         <p:spPr>
           <a:xfrm>
-            <a:off x="7416368" y="2490986"/>
+            <a:off x="11400104" y="3056185"/>
             <a:ext cx="657225" cy="438150"/>
           </a:xfrm>
           <a:prstGeom prst="rect">
@@ -4016,7 +4018,7 @@
         </p:blipFill>
         <p:spPr>
           <a:xfrm>
-            <a:off x="5673381" y="1701171"/>
+            <a:off x="9657117" y="2266370"/>
             <a:ext cx="276225" cy="419100"/>
           </a:xfrm>
           <a:prstGeom prst="rect">
@@ -4046,7 +4048,7 @@
         </p:blipFill>
         <p:spPr>
           <a:xfrm>
-            <a:off x="1593150" y="1718102"/>
+            <a:off x="5576886" y="2283301"/>
             <a:ext cx="657225" cy="400050"/>
           </a:xfrm>
           <a:prstGeom prst="rect">
@@ -4068,7 +4070,7 @@
         </p:nvSpPr>
         <p:spPr>
           <a:xfrm rot="5400000">
-            <a:off x="3563874" y="467494"/>
+            <a:off x="7547610" y="1032693"/>
             <a:ext cx="576072" cy="3909060"/>
           </a:xfrm>
           <a:prstGeom prst="rightBrace">
@@ -4115,7 +4117,7 @@
         </p:nvSpPr>
         <p:spPr>
           <a:xfrm>
-            <a:off x="25146" y="1261425"/>
+            <a:off x="4008882" y="1826624"/>
             <a:ext cx="1723644" cy="430887"/>
           </a:xfrm>
           <a:prstGeom prst="rect">
@@ -4175,7 +4177,7 @@
         </p:nvSpPr>
         <p:spPr>
           <a:xfrm>
-            <a:off x="1682496" y="2846258"/>
+            <a:off x="5666232" y="3411457"/>
             <a:ext cx="429768" cy="1301682"/>
           </a:xfrm>
           <a:prstGeom prst="rect">
@@ -4224,7 +4226,7 @@
         </p:nvSpPr>
         <p:spPr>
           <a:xfrm>
-            <a:off x="2109168" y="2846258"/>
+            <a:off x="6092904" y="3411457"/>
             <a:ext cx="429768" cy="1301682"/>
           </a:xfrm>
           <a:prstGeom prst="rect">
@@ -4284,7 +4286,7 @@
         </p:blipFill>
         <p:spPr>
           <a:xfrm>
-            <a:off x="2589990" y="2846258"/>
+            <a:off x="6573726" y="3411457"/>
             <a:ext cx="390525" cy="390525"/>
           </a:xfrm>
           <a:prstGeom prst="rect">
@@ -4306,7 +4308,7 @@
         </p:nvSpPr>
         <p:spPr>
           <a:xfrm>
-            <a:off x="3977119" y="4557659"/>
+            <a:off x="7960855" y="5122858"/>
             <a:ext cx="229031" cy="1301682"/>
           </a:xfrm>
           <a:prstGeom prst="rect">
@@ -4355,7 +4357,7 @@
         </p:nvSpPr>
         <p:spPr>
           <a:xfrm>
-            <a:off x="4203055" y="4557659"/>
+            <a:off x="8186791" y="5122858"/>
             <a:ext cx="229031" cy="1301682"/>
           </a:xfrm>
           <a:prstGeom prst="rect">
@@ -4415,7 +4417,7 @@
         </p:blipFill>
         <p:spPr>
           <a:xfrm>
-            <a:off x="4467588" y="5418001"/>
+            <a:off x="8451324" y="5983200"/>
             <a:ext cx="657225" cy="419100"/>
           </a:xfrm>
           <a:prstGeom prst="rect">
@@ -4437,7 +4439,7 @@
         </p:nvSpPr>
         <p:spPr>
           <a:xfrm>
-            <a:off x="3977119" y="2896793"/>
+            <a:off x="7960855" y="3461992"/>
             <a:ext cx="229031" cy="1301682"/>
           </a:xfrm>
           <a:prstGeom prst="rect">
@@ -4486,7 +4488,7 @@
         </p:nvSpPr>
         <p:spPr>
           <a:xfrm>
-            <a:off x="4203055" y="2896793"/>
+            <a:off x="8186791" y="3461992"/>
             <a:ext cx="229031" cy="1301682"/>
           </a:xfrm>
           <a:prstGeom prst="rect">
@@ -4540,7 +4542,7 @@
         </p:nvCxnSpPr>
         <p:spPr>
           <a:xfrm>
-            <a:off x="2606040" y="3493008"/>
+            <a:off x="6589776" y="4058207"/>
             <a:ext cx="1268019" cy="0"/>
           </a:xfrm>
           <a:prstGeom prst="straightConnector1">
@@ -4579,7 +4581,7 @@
         </p:nvSpPr>
         <p:spPr>
           <a:xfrm>
-            <a:off x="2614727" y="3540627"/>
+            <a:off x="6598463" y="4105826"/>
             <a:ext cx="1259332" cy="523220"/>
           </a:xfrm>
           <a:prstGeom prst="rect">
@@ -4643,7 +4645,7 @@
         </p:blipFill>
         <p:spPr>
           <a:xfrm>
-            <a:off x="4432086" y="3779375"/>
+            <a:off x="8415822" y="4344574"/>
             <a:ext cx="790575" cy="419100"/>
           </a:xfrm>
           <a:prstGeom prst="rect">
@@ -4665,7 +4667,7 @@
         </p:nvGrpSpPr>
         <p:grpSpPr>
           <a:xfrm rot="16200000">
-            <a:off x="5793273" y="3440966"/>
+            <a:off x="9777009" y="4006165"/>
             <a:ext cx="1773578" cy="941832"/>
             <a:chOff x="2109168" y="4315968"/>
             <a:chExt cx="1773578" cy="941832"/>
@@ -4763,7 +4765,7 @@
         </p:nvSpPr>
         <p:spPr>
           <a:xfrm>
-            <a:off x="2109168" y="5313881"/>
+            <a:off x="6092904" y="5879080"/>
             <a:ext cx="1435045" cy="523220"/>
           </a:xfrm>
           <a:prstGeom prst="rect">
@@ -4807,7 +4809,7 @@
         </p:nvSpPr>
         <p:spPr>
           <a:xfrm>
-            <a:off x="4002317" y="4176235"/>
+            <a:off x="7986053" y="4741434"/>
             <a:ext cx="429769" cy="369332"/>
           </a:xfrm>
           <a:prstGeom prst="rect">
@@ -4844,7 +4846,7 @@
         </p:nvSpPr>
         <p:spPr>
           <a:xfrm>
-            <a:off x="5246566" y="3928157"/>
+            <a:off x="9230302" y="4493356"/>
             <a:ext cx="236431" cy="1750267"/>
           </a:xfrm>
           <a:prstGeom prst="rightBrace">
@@ -4891,7 +4893,7 @@
         </p:nvSpPr>
         <p:spPr>
           <a:xfrm>
-            <a:off x="5653712" y="4176235"/>
+            <a:off x="9637448" y="4741434"/>
             <a:ext cx="229031" cy="1301682"/>
           </a:xfrm>
           <a:prstGeom prst="rect">
@@ -4940,7 +4942,7 @@
         </p:nvSpPr>
         <p:spPr>
           <a:xfrm>
-            <a:off x="5879648" y="4176235"/>
+            <a:off x="9863384" y="4741434"/>
             <a:ext cx="229031" cy="1301682"/>
           </a:xfrm>
           <a:prstGeom prst="rect">
@@ -5000,7 +5002,7 @@
         </p:blipFill>
         <p:spPr>
           <a:xfrm>
-            <a:off x="5672904" y="4608027"/>
+            <a:off x="9656640" y="5173226"/>
             <a:ext cx="400050" cy="390525"/>
           </a:xfrm>
           <a:prstGeom prst="rect">
@@ -5022,7 +5024,7 @@
         </p:nvSpPr>
         <p:spPr>
           <a:xfrm>
-            <a:off x="6944850" y="401948"/>
+            <a:off x="10928586" y="967147"/>
             <a:ext cx="229031" cy="2581124"/>
           </a:xfrm>
           <a:prstGeom prst="rect">
@@ -5071,7 +5073,7 @@
         </p:nvSpPr>
         <p:spPr>
           <a:xfrm>
-            <a:off x="7170786" y="401948"/>
+            <a:off x="11154522" y="967147"/>
             <a:ext cx="229031" cy="2581124"/>
           </a:xfrm>
           <a:prstGeom prst="rect">
@@ -5131,7 +5133,7 @@
         </p:blipFill>
         <p:spPr>
           <a:xfrm>
-            <a:off x="7221417" y="4545567"/>
+            <a:off x="11205153" y="5110766"/>
             <a:ext cx="790575" cy="400050"/>
           </a:xfrm>
           <a:prstGeom prst="rect">
@@ -5153,7 +5155,7 @@
         </p:nvGrpSpPr>
         <p:grpSpPr>
           <a:xfrm>
-            <a:off x="2048379" y="4302041"/>
+            <a:off x="6032115" y="4867240"/>
             <a:ext cx="1773578" cy="941832"/>
             <a:chOff x="2109168" y="4315968"/>
             <a:chExt cx="1773578" cy="941832"/>
@@ -5251,7 +5253,7 @@
         </p:nvSpPr>
         <p:spPr>
           <a:xfrm>
-            <a:off x="451052" y="3611352"/>
+            <a:off x="4434788" y="4176551"/>
             <a:ext cx="2084022" cy="430887"/>
           </a:xfrm>
           <a:prstGeom prst="rect">
@@ -5335,6 +5337,111 @@
                 <a:srgbClr val="FF0000"/>
               </a:solidFill>
             </a:endParaRPr>
+          </a:p>
+        </p:txBody>
+      </p:sp>
+      <p:sp>
+        <p:nvSpPr>
+          <p:cNvPr id="55" name="TextBox 54">
+            <a:extLst>
+              <a:ext uri="{FF2B5EF4-FFF2-40B4-BE49-F238E27FC236}">
+                <a16:creationId xmlns:a16="http://schemas.microsoft.com/office/drawing/2014/main" id="{E1529E1E-C9AF-F24A-7FD1-5C00FF14C654}"/>
+              </a:ext>
+            </a:extLst>
+          </p:cNvPr>
+          <p:cNvSpPr txBox="1"/>
+          <p:nvPr/>
+        </p:nvSpPr>
+        <p:spPr>
+          <a:xfrm>
+            <a:off x="429767" y="338328"/>
+            <a:ext cx="2113407" cy="369332"/>
+          </a:xfrm>
+          <a:prstGeom prst="rect">
+            <a:avLst/>
+          </a:prstGeom>
+          <a:solidFill>
+            <a:schemeClr val="accent5">
+              <a:lumMod val="60000"/>
+              <a:lumOff val="40000"/>
+            </a:schemeClr>
+          </a:solidFill>
+        </p:spPr>
+        <p:txBody>
+          <a:bodyPr wrap="square" rtlCol="0">
+            <a:spAutoFit/>
+          </a:bodyPr>
+          <a:lstStyle/>
+          <a:p>
+            <a:r>
+              <a:rPr lang="en-US" altLang="ko-KR" dirty="0"/>
+              <a:t>Day1 : 5/20, 5/23</a:t>
+            </a:r>
+            <a:endParaRPr lang="ko-KR" altLang="en-US" dirty="0"/>
+          </a:p>
+        </p:txBody>
+      </p:sp>
+      <p:sp>
+        <p:nvSpPr>
+          <p:cNvPr id="58" name="TextBox 57">
+            <a:extLst>
+              <a:ext uri="{FF2B5EF4-FFF2-40B4-BE49-F238E27FC236}">
+                <a16:creationId xmlns:a16="http://schemas.microsoft.com/office/drawing/2014/main" id="{78973C15-2B38-5F13-FC7E-EDB11A3A0113}"/>
+              </a:ext>
+            </a:extLst>
+          </p:cNvPr>
+          <p:cNvSpPr txBox="1"/>
+          <p:nvPr/>
+        </p:nvSpPr>
+        <p:spPr>
+          <a:xfrm>
+            <a:off x="429767" y="707660"/>
+            <a:ext cx="2980385" cy="923330"/>
+          </a:xfrm>
+          <a:prstGeom prst="rect">
+            <a:avLst/>
+          </a:prstGeom>
+          <a:noFill/>
+        </p:spPr>
+        <p:txBody>
+          <a:bodyPr wrap="square" rtlCol="0">
+            <a:spAutoFit/>
+          </a:bodyPr>
+          <a:lstStyle/>
+          <a:p>
+            <a:pPr marL="342900" indent="-342900">
+              <a:buAutoNum type="arabicPeriod"/>
+            </a:pPr>
+            <a:r>
+              <a:rPr lang="en-US" altLang="ko-KR" dirty="0">
+                <a:solidFill>
+                  <a:srgbClr val="FF0000"/>
+                </a:solidFill>
+              </a:rPr>
+              <a:t>Fast reading for paper</a:t>
+            </a:r>
+          </a:p>
+          <a:p>
+            <a:pPr marL="342900" indent="-342900">
+              <a:buAutoNum type="arabicPeriod"/>
+            </a:pPr>
+            <a:r>
+              <a:rPr lang="en-US" altLang="ko-KR" dirty="0">
+                <a:solidFill>
+                  <a:srgbClr val="FF0000"/>
+                </a:solidFill>
+              </a:rPr>
+              <a:t>Review &amp; write</a:t>
+            </a:r>
+          </a:p>
+          <a:p>
+            <a:pPr marL="342900" indent="-342900">
+              <a:buAutoNum type="arabicPeriod"/>
+            </a:pPr>
+            <a:r>
+              <a:rPr lang="en-US" altLang="ko-KR" dirty="0"/>
+              <a:t>Make basic files</a:t>
+            </a:r>
           </a:p>
         </p:txBody>
       </p:sp>
@@ -5390,7 +5497,7 @@
         </p:blipFill>
         <p:spPr>
           <a:xfrm>
-            <a:off x="615315" y="357378"/>
+            <a:off x="615315" y="1843278"/>
             <a:ext cx="9315450" cy="876300"/>
           </a:xfrm>
           <a:prstGeom prst="rect">
@@ -5412,7 +5519,7 @@
         </p:nvSpPr>
         <p:spPr>
           <a:xfrm>
-            <a:off x="694944" y="1444752"/>
+            <a:off x="694944" y="2930652"/>
             <a:ext cx="7050024" cy="338554"/>
           </a:xfrm>
           <a:prstGeom prst="rect">
@@ -5447,7 +5554,7 @@
         </p:nvSpPr>
         <p:spPr>
           <a:xfrm>
-            <a:off x="5349240" y="237744"/>
+            <a:off x="5349240" y="1723644"/>
             <a:ext cx="530352" cy="1078992"/>
           </a:xfrm>
           <a:prstGeom prst="rect">
@@ -5499,7 +5606,7 @@
         </p:nvCxnSpPr>
         <p:spPr>
           <a:xfrm flipH="1">
-            <a:off x="3209544" y="1316736"/>
+            <a:off x="3209544" y="2802636"/>
             <a:ext cx="2139696" cy="1508760"/>
           </a:xfrm>
           <a:prstGeom prst="line">
@@ -5540,7 +5647,7 @@
         </p:nvSpPr>
         <p:spPr>
           <a:xfrm>
-            <a:off x="694944" y="2825496"/>
+            <a:off x="694944" y="4311396"/>
             <a:ext cx="7050024" cy="523220"/>
           </a:xfrm>
           <a:prstGeom prst="rect">
@@ -5598,7 +5705,7 @@
         </p:nvSpPr>
         <p:spPr>
           <a:xfrm>
-            <a:off x="694944" y="3606076"/>
+            <a:off x="694944" y="5091976"/>
             <a:ext cx="8677656" cy="1169551"/>
           </a:xfrm>
           <a:prstGeom prst="rect">
@@ -5723,10 +5830,440 @@
           </a:p>
         </p:txBody>
       </p:sp>
+      <p:sp>
+        <p:nvSpPr>
+          <p:cNvPr id="13" name="TextBox 12">
+            <a:extLst>
+              <a:ext uri="{FF2B5EF4-FFF2-40B4-BE49-F238E27FC236}">
+                <a16:creationId xmlns:a16="http://schemas.microsoft.com/office/drawing/2014/main" id="{54B92D09-8F03-08FF-B8B5-7184D6E0B48F}"/>
+              </a:ext>
+            </a:extLst>
+          </p:cNvPr>
+          <p:cNvSpPr txBox="1"/>
+          <p:nvPr/>
+        </p:nvSpPr>
+        <p:spPr>
+          <a:xfrm>
+            <a:off x="429767" y="338328"/>
+            <a:ext cx="2113407" cy="369332"/>
+          </a:xfrm>
+          <a:prstGeom prst="rect">
+            <a:avLst/>
+          </a:prstGeom>
+          <a:solidFill>
+            <a:schemeClr val="accent5">
+              <a:lumMod val="60000"/>
+              <a:lumOff val="40000"/>
+            </a:schemeClr>
+          </a:solidFill>
+        </p:spPr>
+        <p:txBody>
+          <a:bodyPr wrap="square" rtlCol="0">
+            <a:spAutoFit/>
+          </a:bodyPr>
+          <a:lstStyle/>
+          <a:p>
+            <a:r>
+              <a:rPr lang="en-US" altLang="ko-KR" dirty="0"/>
+              <a:t>Day1 : 5/20, 5/23</a:t>
+            </a:r>
+            <a:endParaRPr lang="ko-KR" altLang="en-US" dirty="0"/>
+          </a:p>
+        </p:txBody>
+      </p:sp>
+      <p:sp>
+        <p:nvSpPr>
+          <p:cNvPr id="14" name="TextBox 13">
+            <a:extLst>
+              <a:ext uri="{FF2B5EF4-FFF2-40B4-BE49-F238E27FC236}">
+                <a16:creationId xmlns:a16="http://schemas.microsoft.com/office/drawing/2014/main" id="{6A67EA55-CAA8-DA1E-6297-6E7AB03F4C40}"/>
+              </a:ext>
+            </a:extLst>
+          </p:cNvPr>
+          <p:cNvSpPr txBox="1"/>
+          <p:nvPr/>
+        </p:nvSpPr>
+        <p:spPr>
+          <a:xfrm>
+            <a:off x="429767" y="707660"/>
+            <a:ext cx="2980385" cy="923330"/>
+          </a:xfrm>
+          <a:prstGeom prst="rect">
+            <a:avLst/>
+          </a:prstGeom>
+          <a:noFill/>
+        </p:spPr>
+        <p:txBody>
+          <a:bodyPr wrap="square" rtlCol="0">
+            <a:spAutoFit/>
+          </a:bodyPr>
+          <a:lstStyle/>
+          <a:p>
+            <a:pPr marL="342900" indent="-342900">
+              <a:buAutoNum type="arabicPeriod"/>
+            </a:pPr>
+            <a:r>
+              <a:rPr lang="en-US" altLang="ko-KR" dirty="0">
+                <a:solidFill>
+                  <a:srgbClr val="FF0000"/>
+                </a:solidFill>
+              </a:rPr>
+              <a:t>Fast reading for paper</a:t>
+            </a:r>
+          </a:p>
+          <a:p>
+            <a:pPr marL="342900" indent="-342900">
+              <a:buAutoNum type="arabicPeriod"/>
+            </a:pPr>
+            <a:r>
+              <a:rPr lang="en-US" altLang="ko-KR" dirty="0">
+                <a:solidFill>
+                  <a:srgbClr val="FF0000"/>
+                </a:solidFill>
+              </a:rPr>
+              <a:t>Review &amp; write</a:t>
+            </a:r>
+          </a:p>
+          <a:p>
+            <a:pPr marL="342900" indent="-342900">
+              <a:buAutoNum type="arabicPeriod"/>
+            </a:pPr>
+            <a:r>
+              <a:rPr lang="en-US" altLang="ko-KR" dirty="0"/>
+              <a:t>Make basic files</a:t>
+            </a:r>
+          </a:p>
+        </p:txBody>
+      </p:sp>
     </p:spTree>
     <p:extLst>
       <p:ext uri="{BB962C8B-B14F-4D97-AF65-F5344CB8AC3E}">
         <p14:creationId xmlns:p14="http://schemas.microsoft.com/office/powerpoint/2010/main" val="383666415"/>
+      </p:ext>
+    </p:extLst>
+  </p:cSld>
+  <p:clrMapOvr>
+    <a:masterClrMapping/>
+  </p:clrMapOvr>
+</p:sld>
+</file>
+
+<file path=ppt/slides/slide3.xml><?xml version="1.0" encoding="utf-8"?>
+<p:sld xmlns:a="http://schemas.openxmlformats.org/drawingml/2006/main" xmlns:r="http://schemas.openxmlformats.org/officeDocument/2006/relationships" xmlns:p="http://schemas.openxmlformats.org/presentationml/2006/main">
+  <p:cSld>
+    <p:spTree>
+      <p:nvGrpSpPr>
+        <p:cNvPr id="1" name=""/>
+        <p:cNvGrpSpPr/>
+        <p:nvPr/>
+      </p:nvGrpSpPr>
+      <p:grpSpPr>
+        <a:xfrm>
+          <a:off x="0" y="0"/>
+          <a:ext cx="0" cy="0"/>
+          <a:chOff x="0" y="0"/>
+          <a:chExt cx="0" cy="0"/>
+        </a:xfrm>
+      </p:grpSpPr>
+      <p:sp>
+        <p:nvSpPr>
+          <p:cNvPr id="12" name="TextBox 11">
+            <a:extLst>
+              <a:ext uri="{FF2B5EF4-FFF2-40B4-BE49-F238E27FC236}">
+                <a16:creationId xmlns:a16="http://schemas.microsoft.com/office/drawing/2014/main" id="{AD6C9DBF-A96A-CC05-9D02-093AFB03C60D}"/>
+              </a:ext>
+            </a:extLst>
+          </p:cNvPr>
+          <p:cNvSpPr txBox="1"/>
+          <p:nvPr/>
+        </p:nvSpPr>
+        <p:spPr>
+          <a:xfrm>
+            <a:off x="429767" y="707660"/>
+            <a:ext cx="3065907" cy="1200329"/>
+          </a:xfrm>
+          <a:prstGeom prst="rect">
+            <a:avLst/>
+          </a:prstGeom>
+          <a:noFill/>
+        </p:spPr>
+        <p:txBody>
+          <a:bodyPr wrap="square" rtlCol="0">
+            <a:spAutoFit/>
+          </a:bodyPr>
+          <a:lstStyle/>
+          <a:p>
+            <a:pPr marL="342900" indent="-342900">
+              <a:buAutoNum type="arabicPeriod"/>
+            </a:pPr>
+            <a:r>
+              <a:rPr lang="en-US" altLang="ko-KR" dirty="0"/>
+              <a:t>Fast reading for paper</a:t>
+            </a:r>
+          </a:p>
+          <a:p>
+            <a:pPr marL="342900" indent="-342900">
+              <a:buAutoNum type="arabicPeriod"/>
+            </a:pPr>
+            <a:r>
+              <a:rPr lang="en-US" altLang="ko-KR" dirty="0"/>
+              <a:t>Review &amp; write</a:t>
+            </a:r>
+          </a:p>
+          <a:p>
+            <a:pPr marL="342900" indent="-342900">
+              <a:buAutoNum type="arabicPeriod"/>
+            </a:pPr>
+            <a:r>
+              <a:rPr lang="en-US" altLang="ko-KR" dirty="0">
+                <a:solidFill>
+                  <a:srgbClr val="FF0000"/>
+                </a:solidFill>
+              </a:rPr>
+              <a:t>Make basic files</a:t>
+            </a:r>
+          </a:p>
+          <a:p>
+            <a:pPr marL="285750" indent="-285750">
+              <a:buFontTx/>
+              <a:buChar char="-"/>
+            </a:pPr>
+            <a:r>
+              <a:rPr lang="en-US" altLang="ko-KR" dirty="0">
+                <a:solidFill>
+                  <a:srgbClr val="FF0000"/>
+                </a:solidFill>
+              </a:rPr>
+              <a:t>cifar10 python</a:t>
+            </a:r>
+          </a:p>
+        </p:txBody>
+      </p:sp>
+      <p:sp>
+        <p:nvSpPr>
+          <p:cNvPr id="13" name="TextBox 12">
+            <a:extLst>
+              <a:ext uri="{FF2B5EF4-FFF2-40B4-BE49-F238E27FC236}">
+                <a16:creationId xmlns:a16="http://schemas.microsoft.com/office/drawing/2014/main" id="{CD189F30-BA44-6C5E-5891-9C02D8C23382}"/>
+              </a:ext>
+            </a:extLst>
+          </p:cNvPr>
+          <p:cNvSpPr txBox="1"/>
+          <p:nvPr/>
+        </p:nvSpPr>
+        <p:spPr>
+          <a:xfrm>
+            <a:off x="429767" y="338328"/>
+            <a:ext cx="2113407" cy="369332"/>
+          </a:xfrm>
+          <a:prstGeom prst="rect">
+            <a:avLst/>
+          </a:prstGeom>
+          <a:solidFill>
+            <a:schemeClr val="accent5">
+              <a:lumMod val="60000"/>
+              <a:lumOff val="40000"/>
+            </a:schemeClr>
+          </a:solidFill>
+        </p:spPr>
+        <p:txBody>
+          <a:bodyPr wrap="square" rtlCol="0">
+            <a:spAutoFit/>
+          </a:bodyPr>
+          <a:lstStyle/>
+          <a:p>
+            <a:r>
+              <a:rPr lang="en-US" altLang="ko-KR" dirty="0"/>
+              <a:t>Day1 : 5/20, 5/23</a:t>
+            </a:r>
+            <a:endParaRPr lang="ko-KR" altLang="en-US" dirty="0"/>
+          </a:p>
+        </p:txBody>
+      </p:sp>
+      <p:pic>
+        <p:nvPicPr>
+          <p:cNvPr id="3" name="그림 2">
+            <a:extLst>
+              <a:ext uri="{FF2B5EF4-FFF2-40B4-BE49-F238E27FC236}">
+                <a16:creationId xmlns:a16="http://schemas.microsoft.com/office/drawing/2014/main" id="{F7D42EA9-F3BB-CAA9-5AF0-26FD2E97F2EC}"/>
+              </a:ext>
+            </a:extLst>
+          </p:cNvPr>
+          <p:cNvPicPr>
+            <a:picLocks noChangeAspect="1"/>
+          </p:cNvPicPr>
+          <p:nvPr/>
+        </p:nvPicPr>
+        <p:blipFill>
+          <a:blip r:embed="rId2"/>
+          <a:stretch>
+            <a:fillRect/>
+          </a:stretch>
+        </p:blipFill>
+        <p:spPr>
+          <a:xfrm>
+            <a:off x="5485258" y="252412"/>
+            <a:ext cx="6562725" cy="6353175"/>
+          </a:xfrm>
+          <a:prstGeom prst="rect">
+            <a:avLst/>
+          </a:prstGeom>
+        </p:spPr>
+      </p:pic>
+      <p:pic>
+        <p:nvPicPr>
+          <p:cNvPr id="14" name="그림 13">
+            <a:extLst>
+              <a:ext uri="{FF2B5EF4-FFF2-40B4-BE49-F238E27FC236}">
+                <a16:creationId xmlns:a16="http://schemas.microsoft.com/office/drawing/2014/main" id="{B9A2FC5E-2DB4-1C59-AECA-31803629A9EE}"/>
+              </a:ext>
+            </a:extLst>
+          </p:cNvPr>
+          <p:cNvPicPr>
+            <a:picLocks noChangeAspect="1"/>
+          </p:cNvPicPr>
+          <p:nvPr/>
+        </p:nvPicPr>
+        <p:blipFill>
+          <a:blip r:embed="rId3"/>
+          <a:stretch>
+            <a:fillRect/>
+          </a:stretch>
+        </p:blipFill>
+        <p:spPr>
+          <a:xfrm>
+            <a:off x="144017" y="2075903"/>
+            <a:ext cx="5448300" cy="790575"/>
+          </a:xfrm>
+          <a:prstGeom prst="rect">
+            <a:avLst/>
+          </a:prstGeom>
+        </p:spPr>
+      </p:pic>
+    </p:spTree>
+    <p:extLst>
+      <p:ext uri="{BB962C8B-B14F-4D97-AF65-F5344CB8AC3E}">
+        <p14:creationId xmlns:p14="http://schemas.microsoft.com/office/powerpoint/2010/main" val="309782769"/>
+      </p:ext>
+    </p:extLst>
+  </p:cSld>
+  <p:clrMapOvr>
+    <a:masterClrMapping/>
+  </p:clrMapOvr>
+</p:sld>
+</file>
+
+<file path=ppt/slides/slide4.xml><?xml version="1.0" encoding="utf-8"?>
+<p:sld xmlns:a="http://schemas.openxmlformats.org/drawingml/2006/main" xmlns:r="http://schemas.openxmlformats.org/officeDocument/2006/relationships" xmlns:p="http://schemas.openxmlformats.org/presentationml/2006/main">
+  <p:cSld>
+    <p:spTree>
+      <p:nvGrpSpPr>
+        <p:cNvPr id="1" name=""/>
+        <p:cNvGrpSpPr/>
+        <p:nvPr/>
+      </p:nvGrpSpPr>
+      <p:grpSpPr>
+        <a:xfrm>
+          <a:off x="0" y="0"/>
+          <a:ext cx="0" cy="0"/>
+          <a:chOff x="0" y="0"/>
+          <a:chExt cx="0" cy="0"/>
+        </a:xfrm>
+      </p:grpSpPr>
+      <p:sp>
+        <p:nvSpPr>
+          <p:cNvPr id="8" name="TextBox 7">
+            <a:extLst>
+              <a:ext uri="{FF2B5EF4-FFF2-40B4-BE49-F238E27FC236}">
+                <a16:creationId xmlns:a16="http://schemas.microsoft.com/office/drawing/2014/main" id="{D1835D8E-2CE0-69D8-683B-8C2F9725A7A6}"/>
+              </a:ext>
+            </a:extLst>
+          </p:cNvPr>
+          <p:cNvSpPr txBox="1"/>
+          <p:nvPr/>
+        </p:nvSpPr>
+        <p:spPr>
+          <a:xfrm>
+            <a:off x="429768" y="338328"/>
+            <a:ext cx="1014984" cy="369332"/>
+          </a:xfrm>
+          <a:prstGeom prst="rect">
+            <a:avLst/>
+          </a:prstGeom>
+          <a:solidFill>
+            <a:schemeClr val="accent5">
+              <a:lumMod val="60000"/>
+              <a:lumOff val="40000"/>
+            </a:schemeClr>
+          </a:solidFill>
+        </p:spPr>
+        <p:txBody>
+          <a:bodyPr wrap="square" rtlCol="0">
+            <a:spAutoFit/>
+          </a:bodyPr>
+          <a:lstStyle/>
+          <a:p>
+            <a:r>
+              <a:rPr lang="en-US" altLang="ko-KR" dirty="0"/>
+              <a:t>Day2</a:t>
+            </a:r>
+            <a:endParaRPr lang="ko-KR" altLang="en-US" dirty="0"/>
+          </a:p>
+        </p:txBody>
+      </p:sp>
+      <p:sp>
+        <p:nvSpPr>
+          <p:cNvPr id="12" name="TextBox 11">
+            <a:extLst>
+              <a:ext uri="{FF2B5EF4-FFF2-40B4-BE49-F238E27FC236}">
+                <a16:creationId xmlns:a16="http://schemas.microsoft.com/office/drawing/2014/main" id="{AD6C9DBF-A96A-CC05-9D02-093AFB03C60D}"/>
+              </a:ext>
+            </a:extLst>
+          </p:cNvPr>
+          <p:cNvSpPr txBox="1"/>
+          <p:nvPr/>
+        </p:nvSpPr>
+        <p:spPr>
+          <a:xfrm>
+            <a:off x="429768" y="707660"/>
+            <a:ext cx="2523744" cy="646331"/>
+          </a:xfrm>
+          <a:prstGeom prst="rect">
+            <a:avLst/>
+          </a:prstGeom>
+          <a:noFill/>
+        </p:spPr>
+        <p:txBody>
+          <a:bodyPr wrap="square" rtlCol="0">
+            <a:spAutoFit/>
+          </a:bodyPr>
+          <a:lstStyle/>
+          <a:p>
+            <a:r>
+              <a:rPr lang="en-US" altLang="ko-KR" dirty="0">
+                <a:solidFill>
+                  <a:srgbClr val="FF0000"/>
+                </a:solidFill>
+              </a:rPr>
+              <a:t>2. Review &amp; write</a:t>
+            </a:r>
+          </a:p>
+          <a:p>
+            <a:r>
+              <a:rPr lang="en-US" altLang="ko-KR" dirty="0">
+                <a:solidFill>
+                  <a:srgbClr val="FF0000"/>
+                </a:solidFill>
+              </a:rPr>
+              <a:t>3. Make basic files</a:t>
+            </a:r>
+          </a:p>
+        </p:txBody>
+      </p:sp>
+    </p:spTree>
+    <p:extLst>
+      <p:ext uri="{BB962C8B-B14F-4D97-AF65-F5344CB8AC3E}">
+        <p14:creationId xmlns:p14="http://schemas.microsoft.com/office/powerpoint/2010/main" val="2291412872"/>
       </p:ext>
     </p:extLst>
   </p:cSld>

</xml_diff>

<commit_message>
Rename: Rename resnet to models
</commit_message>
<xml_diff>
--- a/PPT/fishnet_understanding.pptx
+++ b/PPT/fishnet_understanding.pptx
@@ -7,8 +7,9 @@
   <p:sldIdLst>
     <p:sldId id="256" r:id="rId2"/>
     <p:sldId id="257" r:id="rId3"/>
-    <p:sldId id="259" r:id="rId4"/>
-    <p:sldId id="258" r:id="rId5"/>
+    <p:sldId id="260" r:id="rId4"/>
+    <p:sldId id="259" r:id="rId5"/>
+    <p:sldId id="258" r:id="rId6"/>
   </p:sldIdLst>
   <p:sldSz cx="12192000" cy="6858000"/>
   <p:notesSz cx="6858000" cy="9144000"/>
@@ -5967,6 +5968,199 @@
       </p:grpSpPr>
       <p:sp>
         <p:nvSpPr>
+          <p:cNvPr id="13" name="TextBox 12">
+            <a:extLst>
+              <a:ext uri="{FF2B5EF4-FFF2-40B4-BE49-F238E27FC236}">
+                <a16:creationId xmlns:a16="http://schemas.microsoft.com/office/drawing/2014/main" id="{54B92D09-8F03-08FF-B8B5-7184D6E0B48F}"/>
+              </a:ext>
+            </a:extLst>
+          </p:cNvPr>
+          <p:cNvSpPr txBox="1"/>
+          <p:nvPr/>
+        </p:nvSpPr>
+        <p:spPr>
+          <a:xfrm>
+            <a:off x="429767" y="338328"/>
+            <a:ext cx="2113407" cy="369332"/>
+          </a:xfrm>
+          <a:prstGeom prst="rect">
+            <a:avLst/>
+          </a:prstGeom>
+          <a:solidFill>
+            <a:schemeClr val="accent5">
+              <a:lumMod val="60000"/>
+              <a:lumOff val="40000"/>
+            </a:schemeClr>
+          </a:solidFill>
+        </p:spPr>
+        <p:txBody>
+          <a:bodyPr wrap="square" rtlCol="0">
+            <a:spAutoFit/>
+          </a:bodyPr>
+          <a:lstStyle/>
+          <a:p>
+            <a:r>
+              <a:rPr lang="en-US" altLang="ko-KR" dirty="0"/>
+              <a:t>Day1 : 5/20, 5/23</a:t>
+            </a:r>
+            <a:endParaRPr lang="ko-KR" altLang="en-US" dirty="0"/>
+          </a:p>
+        </p:txBody>
+      </p:sp>
+      <p:sp>
+        <p:nvSpPr>
+          <p:cNvPr id="14" name="TextBox 13">
+            <a:extLst>
+              <a:ext uri="{FF2B5EF4-FFF2-40B4-BE49-F238E27FC236}">
+                <a16:creationId xmlns:a16="http://schemas.microsoft.com/office/drawing/2014/main" id="{6A67EA55-CAA8-DA1E-6297-6E7AB03F4C40}"/>
+              </a:ext>
+            </a:extLst>
+          </p:cNvPr>
+          <p:cNvSpPr txBox="1"/>
+          <p:nvPr/>
+        </p:nvSpPr>
+        <p:spPr>
+          <a:xfrm>
+            <a:off x="429767" y="707660"/>
+            <a:ext cx="2980385" cy="923330"/>
+          </a:xfrm>
+          <a:prstGeom prst="rect">
+            <a:avLst/>
+          </a:prstGeom>
+          <a:noFill/>
+        </p:spPr>
+        <p:txBody>
+          <a:bodyPr wrap="square" rtlCol="0">
+            <a:spAutoFit/>
+          </a:bodyPr>
+          <a:lstStyle/>
+          <a:p>
+            <a:pPr marL="342900" indent="-342900">
+              <a:buAutoNum type="arabicPeriod"/>
+            </a:pPr>
+            <a:r>
+              <a:rPr lang="en-US" altLang="ko-KR" dirty="0">
+                <a:solidFill>
+                  <a:srgbClr val="FF0000"/>
+                </a:solidFill>
+              </a:rPr>
+              <a:t>Fast reading for paper</a:t>
+            </a:r>
+          </a:p>
+          <a:p>
+            <a:pPr marL="342900" indent="-342900">
+              <a:buAutoNum type="arabicPeriod"/>
+            </a:pPr>
+            <a:r>
+              <a:rPr lang="en-US" altLang="ko-KR" dirty="0">
+                <a:solidFill>
+                  <a:srgbClr val="FF0000"/>
+                </a:solidFill>
+              </a:rPr>
+              <a:t>Review &amp; write</a:t>
+            </a:r>
+          </a:p>
+          <a:p>
+            <a:pPr marL="342900" indent="-342900">
+              <a:buAutoNum type="arabicPeriod"/>
+            </a:pPr>
+            <a:r>
+              <a:rPr lang="en-US" altLang="ko-KR" dirty="0"/>
+              <a:t>Make basic files</a:t>
+            </a:r>
+          </a:p>
+        </p:txBody>
+      </p:sp>
+      <p:sp>
+        <p:nvSpPr>
+          <p:cNvPr id="2" name="TextBox 1">
+            <a:extLst>
+              <a:ext uri="{FF2B5EF4-FFF2-40B4-BE49-F238E27FC236}">
+                <a16:creationId xmlns:a16="http://schemas.microsoft.com/office/drawing/2014/main" id="{CC84AC8C-7ECC-21C3-94BD-1D46D8A0E023}"/>
+              </a:ext>
+            </a:extLst>
+          </p:cNvPr>
+          <p:cNvSpPr txBox="1"/>
+          <p:nvPr/>
+        </p:nvSpPr>
+        <p:spPr>
+          <a:xfrm>
+            <a:off x="695325" y="2276475"/>
+            <a:ext cx="9658350" cy="646331"/>
+          </a:xfrm>
+          <a:prstGeom prst="rect">
+            <a:avLst/>
+          </a:prstGeom>
+          <a:noFill/>
+        </p:spPr>
+        <p:txBody>
+          <a:bodyPr wrap="square" rtlCol="0">
+            <a:spAutoFit/>
+          </a:bodyPr>
+          <a:lstStyle/>
+          <a:p>
+            <a:r>
+              <a:rPr lang="ko-KR" altLang="en-US" dirty="0"/>
+              <a:t>모순이라고 생각한 점 </a:t>
+            </a:r>
+            <a:r>
+              <a:rPr lang="en-US" altLang="ko-KR" dirty="0"/>
+              <a:t>: </a:t>
+            </a:r>
+            <a:r>
+              <a:rPr lang="ko-KR" altLang="en-US" dirty="0"/>
+              <a:t>백본에서는 왜 그냥 </a:t>
+            </a:r>
+            <a:r>
+              <a:rPr lang="en-US" altLang="ko-KR" dirty="0"/>
+              <a:t>conv1x1</a:t>
+            </a:r>
+            <a:r>
+              <a:rPr lang="ko-KR" altLang="en-US" dirty="0" err="1"/>
+              <a:t>을씀</a:t>
+            </a:r>
+            <a:r>
+              <a:rPr lang="en-US" altLang="ko-KR" dirty="0"/>
+              <a:t>…?</a:t>
+            </a:r>
+          </a:p>
+          <a:p>
+            <a:endParaRPr lang="ko-KR" altLang="en-US" dirty="0"/>
+          </a:p>
+        </p:txBody>
+      </p:sp>
+    </p:spTree>
+    <p:extLst>
+      <p:ext uri="{BB962C8B-B14F-4D97-AF65-F5344CB8AC3E}">
+        <p14:creationId xmlns:p14="http://schemas.microsoft.com/office/powerpoint/2010/main" val="3012971016"/>
+      </p:ext>
+    </p:extLst>
+  </p:cSld>
+  <p:clrMapOvr>
+    <a:masterClrMapping/>
+  </p:clrMapOvr>
+</p:sld>
+</file>
+
+<file path=ppt/slides/slide4.xml><?xml version="1.0" encoding="utf-8"?>
+<p:sld xmlns:a="http://schemas.openxmlformats.org/drawingml/2006/main" xmlns:r="http://schemas.openxmlformats.org/officeDocument/2006/relationships" xmlns:p="http://schemas.openxmlformats.org/presentationml/2006/main">
+  <p:cSld>
+    <p:spTree>
+      <p:nvGrpSpPr>
+        <p:cNvPr id="1" name=""/>
+        <p:cNvGrpSpPr/>
+        <p:nvPr/>
+      </p:nvGrpSpPr>
+      <p:grpSpPr>
+        <a:xfrm>
+          <a:off x="0" y="0"/>
+          <a:ext cx="0" cy="0"/>
+          <a:chOff x="0" y="0"/>
+          <a:chExt cx="0" cy="0"/>
+        </a:xfrm>
+      </p:grpSpPr>
+      <p:sp>
+        <p:nvSpPr>
           <p:cNvPr id="12" name="TextBox 11">
             <a:extLst>
               <a:ext uri="{FF2B5EF4-FFF2-40B4-BE49-F238E27FC236}">
@@ -6153,7 +6347,7 @@
 </p:sld>
 </file>
 
-<file path=ppt/slides/slide4.xml><?xml version="1.0" encoding="utf-8"?>
+<file path=ppt/slides/slide5.xml><?xml version="1.0" encoding="utf-8"?>
 <p:sld xmlns:a="http://schemas.openxmlformats.org/drawingml/2006/main" xmlns:r="http://schemas.openxmlformats.org/officeDocument/2006/relationships" xmlns:p="http://schemas.openxmlformats.org/presentationml/2006/main">
   <p:cSld>
     <p:spTree>

</xml_diff>

<commit_message>
Feat: Head 및 training pipe 구현
Head, fish100/150, trainer(pytorch-lightning)
</commit_message>
<xml_diff>
--- a/PPT/fishnet_understanding.pptx
+++ b/PPT/fishnet_understanding.pptx
@@ -277,7 +277,7 @@
           <a:p>
             <a:fld id="{42174FDF-3701-4CD0-BE4C-4BC2E26DCC5C}" type="datetimeFigureOut">
               <a:rPr lang="ko-KR" altLang="en-US" smtClean="0"/>
-              <a:t>2022-05-23</a:t>
+              <a:t>2022-05-25</a:t>
             </a:fld>
             <a:endParaRPr lang="ko-KR" altLang="en-US"/>
           </a:p>
@@ -475,7 +475,7 @@
           <a:p>
             <a:fld id="{42174FDF-3701-4CD0-BE4C-4BC2E26DCC5C}" type="datetimeFigureOut">
               <a:rPr lang="ko-KR" altLang="en-US" smtClean="0"/>
-              <a:t>2022-05-23</a:t>
+              <a:t>2022-05-25</a:t>
             </a:fld>
             <a:endParaRPr lang="ko-KR" altLang="en-US"/>
           </a:p>
@@ -683,7 +683,7 @@
           <a:p>
             <a:fld id="{42174FDF-3701-4CD0-BE4C-4BC2E26DCC5C}" type="datetimeFigureOut">
               <a:rPr lang="ko-KR" altLang="en-US" smtClean="0"/>
-              <a:t>2022-05-23</a:t>
+              <a:t>2022-05-25</a:t>
             </a:fld>
             <a:endParaRPr lang="ko-KR" altLang="en-US"/>
           </a:p>
@@ -881,7 +881,7 @@
           <a:p>
             <a:fld id="{42174FDF-3701-4CD0-BE4C-4BC2E26DCC5C}" type="datetimeFigureOut">
               <a:rPr lang="ko-KR" altLang="en-US" smtClean="0"/>
-              <a:t>2022-05-23</a:t>
+              <a:t>2022-05-25</a:t>
             </a:fld>
             <a:endParaRPr lang="ko-KR" altLang="en-US"/>
           </a:p>
@@ -1156,7 +1156,7 @@
           <a:p>
             <a:fld id="{42174FDF-3701-4CD0-BE4C-4BC2E26DCC5C}" type="datetimeFigureOut">
               <a:rPr lang="ko-KR" altLang="en-US" smtClean="0"/>
-              <a:t>2022-05-23</a:t>
+              <a:t>2022-05-25</a:t>
             </a:fld>
             <a:endParaRPr lang="ko-KR" altLang="en-US"/>
           </a:p>
@@ -1421,7 +1421,7 @@
           <a:p>
             <a:fld id="{42174FDF-3701-4CD0-BE4C-4BC2E26DCC5C}" type="datetimeFigureOut">
               <a:rPr lang="ko-KR" altLang="en-US" smtClean="0"/>
-              <a:t>2022-05-23</a:t>
+              <a:t>2022-05-25</a:t>
             </a:fld>
             <a:endParaRPr lang="ko-KR" altLang="en-US"/>
           </a:p>
@@ -1833,7 +1833,7 @@
           <a:p>
             <a:fld id="{42174FDF-3701-4CD0-BE4C-4BC2E26DCC5C}" type="datetimeFigureOut">
               <a:rPr lang="ko-KR" altLang="en-US" smtClean="0"/>
-              <a:t>2022-05-23</a:t>
+              <a:t>2022-05-25</a:t>
             </a:fld>
             <a:endParaRPr lang="ko-KR" altLang="en-US"/>
           </a:p>
@@ -1974,7 +1974,7 @@
           <a:p>
             <a:fld id="{42174FDF-3701-4CD0-BE4C-4BC2E26DCC5C}" type="datetimeFigureOut">
               <a:rPr lang="ko-KR" altLang="en-US" smtClean="0"/>
-              <a:t>2022-05-23</a:t>
+              <a:t>2022-05-25</a:t>
             </a:fld>
             <a:endParaRPr lang="ko-KR" altLang="en-US"/>
           </a:p>
@@ -2087,7 +2087,7 @@
           <a:p>
             <a:fld id="{42174FDF-3701-4CD0-BE4C-4BC2E26DCC5C}" type="datetimeFigureOut">
               <a:rPr lang="ko-KR" altLang="en-US" smtClean="0"/>
-              <a:t>2022-05-23</a:t>
+              <a:t>2022-05-25</a:t>
             </a:fld>
             <a:endParaRPr lang="ko-KR" altLang="en-US"/>
           </a:p>
@@ -2398,7 +2398,7 @@
           <a:p>
             <a:fld id="{42174FDF-3701-4CD0-BE4C-4BC2E26DCC5C}" type="datetimeFigureOut">
               <a:rPr lang="ko-KR" altLang="en-US" smtClean="0"/>
-              <a:t>2022-05-23</a:t>
+              <a:t>2022-05-25</a:t>
             </a:fld>
             <a:endParaRPr lang="ko-KR" altLang="en-US"/>
           </a:p>
@@ -2686,7 +2686,7 @@
           <a:p>
             <a:fld id="{42174FDF-3701-4CD0-BE4C-4BC2E26DCC5C}" type="datetimeFigureOut">
               <a:rPr lang="ko-KR" altLang="en-US" smtClean="0"/>
-              <a:t>2022-05-23</a:t>
+              <a:t>2022-05-25</a:t>
             </a:fld>
             <a:endParaRPr lang="ko-KR" altLang="en-US"/>
           </a:p>
@@ -2927,7 +2927,7 @@
           <a:p>
             <a:fld id="{42174FDF-3701-4CD0-BE4C-4BC2E26DCC5C}" type="datetimeFigureOut">
               <a:rPr lang="ko-KR" altLang="en-US" smtClean="0"/>
-              <a:t>2022-05-23</a:t>
+              <a:t>2022-05-25</a:t>
             </a:fld>
             <a:endParaRPr lang="ko-KR" altLang="en-US"/>
           </a:p>
@@ -19170,14 +19170,14 @@
           <p:nvPr>
             <p:extLst>
               <p:ext uri="{D42A27DB-BD31-4B8C-83A1-F6EECF244321}">
-                <p14:modId xmlns:p14="http://schemas.microsoft.com/office/powerpoint/2010/main" val="4027341293"/>
+                <p14:modId xmlns:p14="http://schemas.microsoft.com/office/powerpoint/2010/main" val="123228696"/>
               </p:ext>
             </p:extLst>
           </p:nvPr>
         </p:nvGraphicFramePr>
         <p:xfrm>
           <a:off x="234508" y="1418541"/>
-          <a:ext cx="11128824" cy="5110130"/>
+          <a:ext cx="11128830" cy="5276998"/>
         </p:xfrm>
         <a:graphic>
           <a:graphicData uri="http://schemas.openxmlformats.org/drawingml/2006/table">
@@ -19186,98 +19186,105 @@
                 <a:tableStyleId>{5C22544A-7EE6-4342-B048-85BDC9FD1C3A}</a:tableStyleId>
               </a:tblPr>
               <a:tblGrid>
-                <a:gridCol w="794916">
+                <a:gridCol w="741922">
                   <a:extLst>
                     <a:ext uri="{9D8B030D-6E8A-4147-A177-3AD203B41FA5}">
                       <a16:colId xmlns:a16="http://schemas.microsoft.com/office/drawing/2014/main" val="3288724512"/>
                     </a:ext>
                   </a:extLst>
                 </a:gridCol>
-                <a:gridCol w="794916">
+                <a:gridCol w="741922">
                   <a:extLst>
                     <a:ext uri="{9D8B030D-6E8A-4147-A177-3AD203B41FA5}">
                       <a16:colId xmlns:a16="http://schemas.microsoft.com/office/drawing/2014/main" val="2615618974"/>
                     </a:ext>
                   </a:extLst>
                 </a:gridCol>
-                <a:gridCol w="794916">
+                <a:gridCol w="741922">
                   <a:extLst>
                     <a:ext uri="{9D8B030D-6E8A-4147-A177-3AD203B41FA5}">
                       <a16:colId xmlns:a16="http://schemas.microsoft.com/office/drawing/2014/main" val="1361492064"/>
                     </a:ext>
                   </a:extLst>
                 </a:gridCol>
-                <a:gridCol w="794916">
+                <a:gridCol w="741922">
                   <a:extLst>
                     <a:ext uri="{9D8B030D-6E8A-4147-A177-3AD203B41FA5}">
                       <a16:colId xmlns:a16="http://schemas.microsoft.com/office/drawing/2014/main" val="127358539"/>
                     </a:ext>
                   </a:extLst>
                 </a:gridCol>
-                <a:gridCol w="794916">
+                <a:gridCol w="741922">
                   <a:extLst>
                     <a:ext uri="{9D8B030D-6E8A-4147-A177-3AD203B41FA5}">
                       <a16:colId xmlns:a16="http://schemas.microsoft.com/office/drawing/2014/main" val="336783192"/>
                     </a:ext>
                   </a:extLst>
                 </a:gridCol>
-                <a:gridCol w="794916">
+                <a:gridCol w="741922">
                   <a:extLst>
                     <a:ext uri="{9D8B030D-6E8A-4147-A177-3AD203B41FA5}">
                       <a16:colId xmlns:a16="http://schemas.microsoft.com/office/drawing/2014/main" val="3121617189"/>
                     </a:ext>
                   </a:extLst>
                 </a:gridCol>
-                <a:gridCol w="794916">
+                <a:gridCol w="741922">
                   <a:extLst>
                     <a:ext uri="{9D8B030D-6E8A-4147-A177-3AD203B41FA5}">
                       <a16:colId xmlns:a16="http://schemas.microsoft.com/office/drawing/2014/main" val="2542967547"/>
                     </a:ext>
                   </a:extLst>
                 </a:gridCol>
-                <a:gridCol w="794916">
+                <a:gridCol w="741922">
                   <a:extLst>
                     <a:ext uri="{9D8B030D-6E8A-4147-A177-3AD203B41FA5}">
                       <a16:colId xmlns:a16="http://schemas.microsoft.com/office/drawing/2014/main" val="3756538027"/>
                     </a:ext>
                   </a:extLst>
                 </a:gridCol>
-                <a:gridCol w="794916">
+                <a:gridCol w="741922">
                   <a:extLst>
                     <a:ext uri="{9D8B030D-6E8A-4147-A177-3AD203B41FA5}">
                       <a16:colId xmlns:a16="http://schemas.microsoft.com/office/drawing/2014/main" val="909102905"/>
                     </a:ext>
                   </a:extLst>
                 </a:gridCol>
-                <a:gridCol w="794916">
+                <a:gridCol w="741922">
                   <a:extLst>
                     <a:ext uri="{9D8B030D-6E8A-4147-A177-3AD203B41FA5}">
                       <a16:colId xmlns:a16="http://schemas.microsoft.com/office/drawing/2014/main" val="4146738828"/>
                     </a:ext>
                   </a:extLst>
                 </a:gridCol>
-                <a:gridCol w="794916">
+                <a:gridCol w="741922">
                   <a:extLst>
                     <a:ext uri="{9D8B030D-6E8A-4147-A177-3AD203B41FA5}">
                       <a16:colId xmlns:a16="http://schemas.microsoft.com/office/drawing/2014/main" val="4232637953"/>
                     </a:ext>
                   </a:extLst>
                 </a:gridCol>
-                <a:gridCol w="794916">
+                <a:gridCol w="741922">
                   <a:extLst>
                     <a:ext uri="{9D8B030D-6E8A-4147-A177-3AD203B41FA5}">
                       <a16:colId xmlns:a16="http://schemas.microsoft.com/office/drawing/2014/main" val="4075987007"/>
                     </a:ext>
                   </a:extLst>
                 </a:gridCol>
-                <a:gridCol w="794916">
+                <a:gridCol w="741922">
+                  <a:extLst>
+                    <a:ext uri="{9D8B030D-6E8A-4147-A177-3AD203B41FA5}">
+                      <a16:colId xmlns:a16="http://schemas.microsoft.com/office/drawing/2014/main" val="3886288783"/>
+                    </a:ext>
+                  </a:extLst>
+                </a:gridCol>
+                <a:gridCol w="741922">
                   <a:extLst>
                     <a:ext uri="{9D8B030D-6E8A-4147-A177-3AD203B41FA5}">
                       <a16:colId xmlns:a16="http://schemas.microsoft.com/office/drawing/2014/main" val="1573771563"/>
                     </a:ext>
                   </a:extLst>
                 </a:gridCol>
-                <a:gridCol w="794916">
+                <a:gridCol w="741922">
                   <a:extLst>
                     <a:ext uri="{9D8B030D-6E8A-4147-A177-3AD203B41FA5}">
                       <a16:colId xmlns:a16="http://schemas.microsoft.com/office/drawing/2014/main" val="2993219280"/>
@@ -19947,7 +19954,81 @@
                     <a:p>
                       <a:pPr algn="ctr" latinLnBrk="1"/>
                       <a:r>
-                        <a:rPr lang="en-US" altLang="ko-KR" sz="1600">
+                        <a:rPr lang="en-US" altLang="ko-KR" sz="1600" dirty="0">
+                          <a:solidFill>
+                            <a:sysClr val="windowText" lastClr="000000"/>
+                          </a:solidFill>
+                        </a:rPr>
+                        <a:t>H1</a:t>
+                      </a:r>
+                      <a:endParaRPr lang="ko-KR" altLang="en-US" sz="1600" dirty="0">
+                        <a:solidFill>
+                          <a:sysClr val="windowText" lastClr="000000"/>
+                        </a:solidFill>
+                      </a:endParaRPr>
+                    </a:p>
+                  </a:txBody>
+                  <a:tcPr anchor="ctr">
+                    <a:lnL w="12700" cap="flat" cmpd="sng" algn="ctr">
+                      <a:solidFill>
+                        <a:schemeClr val="tx1"/>
+                      </a:solidFill>
+                      <a:prstDash val="solid"/>
+                      <a:round/>
+                      <a:headEnd type="none" w="med" len="med"/>
+                      <a:tailEnd type="none" w="med" len="med"/>
+                    </a:lnL>
+                    <a:lnR w="12700" cap="flat" cmpd="sng" algn="ctr">
+                      <a:solidFill>
+                        <a:schemeClr val="tx1"/>
+                      </a:solidFill>
+                      <a:prstDash val="solid"/>
+                      <a:round/>
+                      <a:headEnd type="none" w="med" len="med"/>
+                      <a:tailEnd type="none" w="med" len="med"/>
+                    </a:lnR>
+                    <a:lnT w="12700" cap="flat" cmpd="sng" algn="ctr">
+                      <a:solidFill>
+                        <a:schemeClr val="tx1"/>
+                      </a:solidFill>
+                      <a:prstDash val="solid"/>
+                      <a:round/>
+                      <a:headEnd type="none" w="med" len="med"/>
+                      <a:tailEnd type="none" w="med" len="med"/>
+                    </a:lnT>
+                    <a:lnB w="12700" cap="flat" cmpd="sng" algn="ctr">
+                      <a:solidFill>
+                        <a:schemeClr val="tx1"/>
+                      </a:solidFill>
+                      <a:prstDash val="solid"/>
+                      <a:round/>
+                      <a:headEnd type="none" w="med" len="med"/>
+                      <a:tailEnd type="none" w="med" len="med"/>
+                    </a:lnB>
+                    <a:lnTlToBr w="12700" cmpd="sng">
+                      <a:noFill/>
+                      <a:prstDash val="solid"/>
+                    </a:lnTlToBr>
+                    <a:lnBlToTr w="12700" cmpd="sng">
+                      <a:noFill/>
+                      <a:prstDash val="solid"/>
+                    </a:lnBlToTr>
+                    <a:solidFill>
+                      <a:schemeClr val="accent2">
+                        <a:lumMod val="20000"/>
+                        <a:lumOff val="80000"/>
+                      </a:schemeClr>
+                    </a:solidFill>
+                  </a:tcPr>
+                </a:tc>
+                <a:tc>
+                  <a:txBody>
+                    <a:bodyPr/>
+                    <a:lstStyle/>
+                    <a:p>
+                      <a:pPr algn="ctr" latinLnBrk="1"/>
+                      <a:r>
+                        <a:rPr lang="en-US" altLang="ko-KR" sz="1600" dirty="0">
                           <a:solidFill>
                             <a:sysClr val="windowText" lastClr="000000"/>
                           </a:solidFill>
@@ -20459,6 +20540,80 @@
                             <a:sysClr val="windowText" lastClr="000000"/>
                           </a:solidFill>
                         </a:rPr>
+                        <a:t>48</a:t>
+                      </a:r>
+                      <a:endParaRPr lang="ko-KR" altLang="en-US" sz="1600" dirty="0">
+                        <a:solidFill>
+                          <a:sysClr val="windowText" lastClr="000000"/>
+                        </a:solidFill>
+                      </a:endParaRPr>
+                    </a:p>
+                  </a:txBody>
+                  <a:tcPr anchor="ctr">
+                    <a:lnL w="12700" cap="flat" cmpd="sng" algn="ctr">
+                      <a:solidFill>
+                        <a:schemeClr val="tx1"/>
+                      </a:solidFill>
+                      <a:prstDash val="solid"/>
+                      <a:round/>
+                      <a:headEnd type="none" w="med" len="med"/>
+                      <a:tailEnd type="none" w="med" len="med"/>
+                    </a:lnL>
+                    <a:lnR w="12700" cap="flat" cmpd="sng" algn="ctr">
+                      <a:solidFill>
+                        <a:schemeClr val="tx1"/>
+                      </a:solidFill>
+                      <a:prstDash val="solid"/>
+                      <a:round/>
+                      <a:headEnd type="none" w="med" len="med"/>
+                      <a:tailEnd type="none" w="med" len="med"/>
+                    </a:lnR>
+                    <a:lnT w="12700" cap="flat" cmpd="sng" algn="ctr">
+                      <a:solidFill>
+                        <a:schemeClr val="tx1"/>
+                      </a:solidFill>
+                      <a:prstDash val="solid"/>
+                      <a:round/>
+                      <a:headEnd type="none" w="med" len="med"/>
+                      <a:tailEnd type="none" w="med" len="med"/>
+                    </a:lnT>
+                    <a:lnB w="12700" cap="flat" cmpd="sng" algn="ctr">
+                      <a:solidFill>
+                        <a:schemeClr val="tx1"/>
+                      </a:solidFill>
+                      <a:prstDash val="solid"/>
+                      <a:round/>
+                      <a:headEnd type="none" w="med" len="med"/>
+                      <a:tailEnd type="none" w="med" len="med"/>
+                    </a:lnB>
+                    <a:lnTlToBr w="12700" cmpd="sng">
+                      <a:noFill/>
+                      <a:prstDash val="solid"/>
+                    </a:lnTlToBr>
+                    <a:lnBlToTr w="12700" cmpd="sng">
+                      <a:noFill/>
+                      <a:prstDash val="solid"/>
+                    </a:lnBlToTr>
+                    <a:solidFill>
+                      <a:schemeClr val="accent5">
+                        <a:lumMod val="20000"/>
+                        <a:lumOff val="80000"/>
+                      </a:schemeClr>
+                    </a:solidFill>
+                  </a:tcPr>
+                </a:tc>
+                <a:tc>
+                  <a:txBody>
+                    <a:bodyPr/>
+                    <a:lstStyle/>
+                    <a:p>
+                      <a:pPr algn="ctr" latinLnBrk="1"/>
+                      <a:r>
+                        <a:rPr lang="en-US" altLang="ko-KR" sz="1600" dirty="0">
+                          <a:solidFill>
+                            <a:sysClr val="windowText" lastClr="000000"/>
+                          </a:solidFill>
+                        </a:rPr>
                         <a:t>24</a:t>
                       </a:r>
                       <a:endParaRPr lang="ko-KR" altLang="en-US" sz="1600" dirty="0">
@@ -20681,154 +20836,6 @@
                             <a:sysClr val="windowText" lastClr="000000"/>
                           </a:solidFill>
                         </a:rPr>
-                        <a:t>3</a:t>
-                      </a:r>
-                      <a:endParaRPr lang="ko-KR" altLang="en-US" sz="1600" dirty="0">
-                        <a:solidFill>
-                          <a:sysClr val="windowText" lastClr="000000"/>
-                        </a:solidFill>
-                      </a:endParaRPr>
-                    </a:p>
-                  </a:txBody>
-                  <a:tcPr anchor="ctr">
-                    <a:lnL w="12700" cap="flat" cmpd="sng" algn="ctr">
-                      <a:solidFill>
-                        <a:schemeClr val="tx1"/>
-                      </a:solidFill>
-                      <a:prstDash val="solid"/>
-                      <a:round/>
-                      <a:headEnd type="none" w="med" len="med"/>
-                      <a:tailEnd type="none" w="med" len="med"/>
-                    </a:lnL>
-                    <a:lnR w="12700" cap="flat" cmpd="sng" algn="ctr">
-                      <a:solidFill>
-                        <a:schemeClr val="tx1"/>
-                      </a:solidFill>
-                      <a:prstDash val="solid"/>
-                      <a:round/>
-                      <a:headEnd type="none" w="med" len="med"/>
-                      <a:tailEnd type="none" w="med" len="med"/>
-                    </a:lnR>
-                    <a:lnT w="12700" cap="flat" cmpd="sng" algn="ctr">
-                      <a:solidFill>
-                        <a:schemeClr val="tx1"/>
-                      </a:solidFill>
-                      <a:prstDash val="solid"/>
-                      <a:round/>
-                      <a:headEnd type="none" w="med" len="med"/>
-                      <a:tailEnd type="none" w="med" len="med"/>
-                    </a:lnT>
-                    <a:lnB w="12700" cap="flat" cmpd="sng" algn="ctr">
-                      <a:solidFill>
-                        <a:schemeClr val="tx1"/>
-                      </a:solidFill>
-                      <a:prstDash val="solid"/>
-                      <a:round/>
-                      <a:headEnd type="none" w="med" len="med"/>
-                      <a:tailEnd type="none" w="med" len="med"/>
-                    </a:lnB>
-                    <a:lnTlToBr w="12700" cmpd="sng">
-                      <a:noFill/>
-                      <a:prstDash val="solid"/>
-                    </a:lnTlToBr>
-                    <a:lnBlToTr w="12700" cmpd="sng">
-                      <a:noFill/>
-                      <a:prstDash val="solid"/>
-                    </a:lnBlToTr>
-                    <a:solidFill>
-                      <a:schemeClr val="accent5">
-                        <a:lumMod val="20000"/>
-                        <a:lumOff val="80000"/>
-                      </a:schemeClr>
-                    </a:solidFill>
-                  </a:tcPr>
-                </a:tc>
-                <a:tc>
-                  <a:txBody>
-                    <a:bodyPr/>
-                    <a:lstStyle/>
-                    <a:p>
-                      <a:pPr algn="ctr" latinLnBrk="1"/>
-                      <a:r>
-                        <a:rPr lang="en-US" altLang="ko-KR" sz="1600" dirty="0">
-                          <a:solidFill>
-                            <a:sysClr val="windowText" lastClr="000000"/>
-                          </a:solidFill>
-                        </a:rPr>
-                        <a:t>3</a:t>
-                      </a:r>
-                      <a:endParaRPr lang="ko-KR" altLang="en-US" sz="1600" dirty="0">
-                        <a:solidFill>
-                          <a:sysClr val="windowText" lastClr="000000"/>
-                        </a:solidFill>
-                      </a:endParaRPr>
-                    </a:p>
-                  </a:txBody>
-                  <a:tcPr anchor="ctr">
-                    <a:lnL w="12700" cap="flat" cmpd="sng" algn="ctr">
-                      <a:solidFill>
-                        <a:schemeClr val="tx1"/>
-                      </a:solidFill>
-                      <a:prstDash val="solid"/>
-                      <a:round/>
-                      <a:headEnd type="none" w="med" len="med"/>
-                      <a:tailEnd type="none" w="med" len="med"/>
-                    </a:lnL>
-                    <a:lnR w="12700" cap="flat" cmpd="sng" algn="ctr">
-                      <a:solidFill>
-                        <a:schemeClr val="tx1"/>
-                      </a:solidFill>
-                      <a:prstDash val="solid"/>
-                      <a:round/>
-                      <a:headEnd type="none" w="med" len="med"/>
-                      <a:tailEnd type="none" w="med" len="med"/>
-                    </a:lnR>
-                    <a:lnT w="12700" cap="flat" cmpd="sng" algn="ctr">
-                      <a:solidFill>
-                        <a:schemeClr val="tx1"/>
-                      </a:solidFill>
-                      <a:prstDash val="solid"/>
-                      <a:round/>
-                      <a:headEnd type="none" w="med" len="med"/>
-                      <a:tailEnd type="none" w="med" len="med"/>
-                    </a:lnT>
-                    <a:lnB w="12700" cap="flat" cmpd="sng" algn="ctr">
-                      <a:solidFill>
-                        <a:schemeClr val="tx1"/>
-                      </a:solidFill>
-                      <a:prstDash val="solid"/>
-                      <a:round/>
-                      <a:headEnd type="none" w="med" len="med"/>
-                      <a:tailEnd type="none" w="med" len="med"/>
-                    </a:lnB>
-                    <a:lnTlToBr w="12700" cmpd="sng">
-                      <a:noFill/>
-                      <a:prstDash val="solid"/>
-                    </a:lnTlToBr>
-                    <a:lnBlToTr w="12700" cmpd="sng">
-                      <a:noFill/>
-                      <a:prstDash val="solid"/>
-                    </a:lnBlToTr>
-                    <a:solidFill>
-                      <a:schemeClr val="accent4">
-                        <a:lumMod val="20000"/>
-                        <a:lumOff val="80000"/>
-                      </a:schemeClr>
-                    </a:solidFill>
-                  </a:tcPr>
-                </a:tc>
-                <a:tc>
-                  <a:txBody>
-                    <a:bodyPr/>
-                    <a:lstStyle/>
-                    <a:p>
-                      <a:pPr algn="ctr" latinLnBrk="1"/>
-                      <a:r>
-                        <a:rPr lang="en-US" altLang="ko-KR" sz="1600" dirty="0">
-                          <a:solidFill>
-                            <a:sysClr val="windowText" lastClr="000000"/>
-                          </a:solidFill>
-                        </a:rPr>
                         <a:t>6</a:t>
                       </a:r>
                       <a:endParaRPr lang="ko-KR" altLang="en-US" sz="1600" dirty="0">
@@ -21032,6 +21039,154 @@
                       <a:prstDash val="solid"/>
                     </a:lnBlToTr>
                     <a:solidFill>
+                      <a:schemeClr val="accent4">
+                        <a:lumMod val="20000"/>
+                        <a:lumOff val="80000"/>
+                      </a:schemeClr>
+                    </a:solidFill>
+                  </a:tcPr>
+                </a:tc>
+                <a:tc>
+                  <a:txBody>
+                    <a:bodyPr/>
+                    <a:lstStyle/>
+                    <a:p>
+                      <a:pPr algn="ctr" latinLnBrk="1"/>
+                      <a:r>
+                        <a:rPr lang="en-US" altLang="ko-KR" sz="1600" dirty="0">
+                          <a:solidFill>
+                            <a:sysClr val="windowText" lastClr="000000"/>
+                          </a:solidFill>
+                        </a:rPr>
+                        <a:t>48</a:t>
+                      </a:r>
+                      <a:endParaRPr lang="ko-KR" altLang="en-US" sz="1600" dirty="0">
+                        <a:solidFill>
+                          <a:sysClr val="windowText" lastClr="000000"/>
+                        </a:solidFill>
+                      </a:endParaRPr>
+                    </a:p>
+                  </a:txBody>
+                  <a:tcPr anchor="ctr">
+                    <a:lnL w="12700" cap="flat" cmpd="sng" algn="ctr">
+                      <a:solidFill>
+                        <a:schemeClr val="tx1"/>
+                      </a:solidFill>
+                      <a:prstDash val="solid"/>
+                      <a:round/>
+                      <a:headEnd type="none" w="med" len="med"/>
+                      <a:tailEnd type="none" w="med" len="med"/>
+                    </a:lnL>
+                    <a:lnR w="12700" cap="flat" cmpd="sng" algn="ctr">
+                      <a:solidFill>
+                        <a:schemeClr val="tx1"/>
+                      </a:solidFill>
+                      <a:prstDash val="solid"/>
+                      <a:round/>
+                      <a:headEnd type="none" w="med" len="med"/>
+                      <a:tailEnd type="none" w="med" len="med"/>
+                    </a:lnR>
+                    <a:lnT w="12700" cap="flat" cmpd="sng" algn="ctr">
+                      <a:solidFill>
+                        <a:schemeClr val="tx1"/>
+                      </a:solidFill>
+                      <a:prstDash val="solid"/>
+                      <a:round/>
+                      <a:headEnd type="none" w="med" len="med"/>
+                      <a:tailEnd type="none" w="med" len="med"/>
+                    </a:lnT>
+                    <a:lnB w="12700" cap="flat" cmpd="sng" algn="ctr">
+                      <a:solidFill>
+                        <a:schemeClr val="tx1"/>
+                      </a:solidFill>
+                      <a:prstDash val="solid"/>
+                      <a:round/>
+                      <a:headEnd type="none" w="med" len="med"/>
+                      <a:tailEnd type="none" w="med" len="med"/>
+                    </a:lnB>
+                    <a:lnTlToBr w="12700" cmpd="sng">
+                      <a:noFill/>
+                      <a:prstDash val="solid"/>
+                    </a:lnTlToBr>
+                    <a:lnBlToTr w="12700" cmpd="sng">
+                      <a:noFill/>
+                      <a:prstDash val="solid"/>
+                    </a:lnBlToTr>
+                    <a:solidFill>
+                      <a:schemeClr val="accent2">
+                        <a:lumMod val="20000"/>
+                        <a:lumOff val="80000"/>
+                      </a:schemeClr>
+                    </a:solidFill>
+                  </a:tcPr>
+                </a:tc>
+                <a:tc>
+                  <a:txBody>
+                    <a:bodyPr/>
+                    <a:lstStyle/>
+                    <a:p>
+                      <a:pPr algn="ctr" latinLnBrk="1"/>
+                      <a:r>
+                        <a:rPr lang="en-US" altLang="ko-KR" sz="1600" dirty="0">
+                          <a:solidFill>
+                            <a:sysClr val="windowText" lastClr="000000"/>
+                          </a:solidFill>
+                        </a:rPr>
+                        <a:t>24</a:t>
+                      </a:r>
+                      <a:endParaRPr lang="ko-KR" altLang="en-US" sz="1600" dirty="0">
+                        <a:solidFill>
+                          <a:sysClr val="windowText" lastClr="000000"/>
+                        </a:solidFill>
+                      </a:endParaRPr>
+                    </a:p>
+                  </a:txBody>
+                  <a:tcPr anchor="ctr">
+                    <a:lnL w="12700" cap="flat" cmpd="sng" algn="ctr">
+                      <a:solidFill>
+                        <a:schemeClr val="tx1"/>
+                      </a:solidFill>
+                      <a:prstDash val="solid"/>
+                      <a:round/>
+                      <a:headEnd type="none" w="med" len="med"/>
+                      <a:tailEnd type="none" w="med" len="med"/>
+                    </a:lnL>
+                    <a:lnR w="12700" cap="flat" cmpd="sng" algn="ctr">
+                      <a:solidFill>
+                        <a:schemeClr val="tx1"/>
+                      </a:solidFill>
+                      <a:prstDash val="solid"/>
+                      <a:round/>
+                      <a:headEnd type="none" w="med" len="med"/>
+                      <a:tailEnd type="none" w="med" len="med"/>
+                    </a:lnR>
+                    <a:lnT w="12700" cap="flat" cmpd="sng" algn="ctr">
+                      <a:solidFill>
+                        <a:schemeClr val="tx1"/>
+                      </a:solidFill>
+                      <a:prstDash val="solid"/>
+                      <a:round/>
+                      <a:headEnd type="none" w="med" len="med"/>
+                      <a:tailEnd type="none" w="med" len="med"/>
+                    </a:lnT>
+                    <a:lnB w="12700" cap="flat" cmpd="sng" algn="ctr">
+                      <a:solidFill>
+                        <a:schemeClr val="tx1"/>
+                      </a:solidFill>
+                      <a:prstDash val="solid"/>
+                      <a:round/>
+                      <a:headEnd type="none" w="med" len="med"/>
+                      <a:tailEnd type="none" w="med" len="med"/>
+                    </a:lnB>
+                    <a:lnTlToBr w="12700" cmpd="sng">
+                      <a:noFill/>
+                      <a:prstDash val="solid"/>
+                    </a:lnTlToBr>
+                    <a:lnBlToTr w="12700" cmpd="sng">
+                      <a:noFill/>
+                      <a:prstDash val="solid"/>
+                    </a:lnBlToTr>
+                    <a:solidFill>
                       <a:schemeClr val="accent2">
                         <a:lumMod val="20000"/>
                         <a:lumOff val="80000"/>
@@ -21193,14 +21348,6 @@
                     <a:lstStyle/>
                     <a:p>
                       <a:pPr algn="ctr" latinLnBrk="1"/>
-                      <a:r>
-                        <a:rPr lang="en-US" altLang="ko-KR" sz="1600" dirty="0">
-                          <a:solidFill>
-                            <a:sysClr val="windowText" lastClr="000000"/>
-                          </a:solidFill>
-                        </a:rPr>
-                        <a:t>3&gt;1</a:t>
-                      </a:r>
                       <a:endParaRPr lang="ko-KR" altLang="en-US" sz="1600" dirty="0">
                         <a:solidFill>
                           <a:sysClr val="windowText" lastClr="000000"/>
@@ -21764,7 +21911,7 @@
                             <a:sysClr val="windowText" lastClr="000000"/>
                           </a:solidFill>
                         </a:rPr>
-                        <a:t>2</a:t>
+                        <a:t>1</a:t>
                       </a:r>
                       <a:endParaRPr lang="ko-KR" altLang="en-US" sz="1600" dirty="0">
                         <a:solidFill>
@@ -21838,7 +21985,7 @@
                             <a:sysClr val="windowText" lastClr="000000"/>
                           </a:solidFill>
                         </a:rPr>
-                        <a:t>2</a:t>
+                        <a:t>1</a:t>
                       </a:r>
                       <a:endParaRPr lang="ko-KR" altLang="en-US" sz="1600" dirty="0">
                         <a:solidFill>
@@ -21912,7 +22059,7 @@
                             <a:sysClr val="windowText" lastClr="000000"/>
                           </a:solidFill>
                         </a:rPr>
-                        <a:t>2</a:t>
+                        <a:t>1</a:t>
                       </a:r>
                       <a:endParaRPr lang="ko-KR" altLang="en-US" sz="1600" dirty="0">
                         <a:solidFill>
@@ -21986,7 +22133,7 @@
                             <a:sysClr val="windowText" lastClr="000000"/>
                           </a:solidFill>
                         </a:rPr>
-                        <a:t>2</a:t>
+                        <a:t>1</a:t>
                       </a:r>
                       <a:endParaRPr lang="ko-KR" altLang="en-US" sz="1600" dirty="0">
                         <a:solidFill>
@@ -22060,7 +22207,7 @@
                             <a:sysClr val="windowText" lastClr="000000"/>
                           </a:solidFill>
                         </a:rPr>
-                        <a:t>2</a:t>
+                        <a:t>1</a:t>
                       </a:r>
                       <a:endParaRPr lang="ko-KR" altLang="en-US" sz="1600" dirty="0">
                         <a:solidFill>
@@ -22134,7 +22281,81 @@
                             <a:sysClr val="windowText" lastClr="000000"/>
                           </a:solidFill>
                         </a:rPr>
-                        <a:t>2</a:t>
+                        <a:t>1</a:t>
+                      </a:r>
+                      <a:endParaRPr lang="ko-KR" altLang="en-US" sz="1600" dirty="0">
+                        <a:solidFill>
+                          <a:sysClr val="windowText" lastClr="000000"/>
+                        </a:solidFill>
+                      </a:endParaRPr>
+                    </a:p>
+                  </a:txBody>
+                  <a:tcPr anchor="ctr">
+                    <a:lnL w="12700" cap="flat" cmpd="sng" algn="ctr">
+                      <a:solidFill>
+                        <a:schemeClr val="tx1"/>
+                      </a:solidFill>
+                      <a:prstDash val="solid"/>
+                      <a:round/>
+                      <a:headEnd type="none" w="med" len="med"/>
+                      <a:tailEnd type="none" w="med" len="med"/>
+                    </a:lnL>
+                    <a:lnR w="12700" cap="flat" cmpd="sng" algn="ctr">
+                      <a:solidFill>
+                        <a:schemeClr val="tx1"/>
+                      </a:solidFill>
+                      <a:prstDash val="solid"/>
+                      <a:round/>
+                      <a:headEnd type="none" w="med" len="med"/>
+                      <a:tailEnd type="none" w="med" len="med"/>
+                    </a:lnR>
+                    <a:lnT w="12700" cap="flat" cmpd="sng" algn="ctr">
+                      <a:solidFill>
+                        <a:schemeClr val="tx1"/>
+                      </a:solidFill>
+                      <a:prstDash val="solid"/>
+                      <a:round/>
+                      <a:headEnd type="none" w="med" len="med"/>
+                      <a:tailEnd type="none" w="med" len="med"/>
+                    </a:lnT>
+                    <a:lnB w="12700" cap="flat" cmpd="sng" algn="ctr">
+                      <a:solidFill>
+                        <a:schemeClr val="tx1"/>
+                      </a:solidFill>
+                      <a:prstDash val="solid"/>
+                      <a:round/>
+                      <a:headEnd type="none" w="med" len="med"/>
+                      <a:tailEnd type="none" w="med" len="med"/>
+                    </a:lnB>
+                    <a:lnTlToBr w="12700" cmpd="sng">
+                      <a:noFill/>
+                      <a:prstDash val="solid"/>
+                    </a:lnTlToBr>
+                    <a:lnBlToTr w="12700" cmpd="sng">
+                      <a:noFill/>
+                      <a:prstDash val="solid"/>
+                    </a:lnBlToTr>
+                    <a:solidFill>
+                      <a:schemeClr val="accent2">
+                        <a:lumMod val="20000"/>
+                        <a:lumOff val="80000"/>
+                      </a:schemeClr>
+                    </a:solidFill>
+                  </a:tcPr>
+                </a:tc>
+                <a:tc>
+                  <a:txBody>
+                    <a:bodyPr/>
+                    <a:lstStyle/>
+                    <a:p>
+                      <a:pPr algn="ctr" latinLnBrk="1"/>
+                      <a:r>
+                        <a:rPr lang="en-US" altLang="ko-KR" sz="1600" dirty="0">
+                          <a:solidFill>
+                            <a:sysClr val="windowText" lastClr="000000"/>
+                          </a:solidFill>
+                        </a:rPr>
+                        <a:t>1</a:t>
                       </a:r>
                       <a:endParaRPr lang="ko-KR" altLang="en-US" sz="1600" dirty="0">
                         <a:solidFill>
@@ -22480,7 +22701,7 @@
                             <a:sysClr val="windowText" lastClr="000000"/>
                           </a:solidFill>
                         </a:rPr>
-                        <a:t>9</a:t>
+                        <a:t>9+1</a:t>
                       </a:r>
                       <a:endParaRPr lang="ko-KR" altLang="en-US" sz="1600" dirty="0">
                         <a:solidFill>
@@ -22548,6 +22769,14 @@
                     <a:lstStyle/>
                     <a:p>
                       <a:pPr algn="ctr" latinLnBrk="1"/>
+                      <a:r>
+                        <a:rPr lang="en-US" altLang="ko-KR" sz="1600" dirty="0">
+                          <a:solidFill>
+                            <a:sysClr val="windowText" lastClr="000000"/>
+                          </a:solidFill>
+                        </a:rPr>
+                        <a:t>12+1</a:t>
+                      </a:r>
                       <a:endParaRPr lang="ko-KR" altLang="en-US" sz="1600" dirty="0">
                         <a:solidFill>
                           <a:sysClr val="windowText" lastClr="000000"/>
@@ -22614,6 +22843,14 @@
                     <a:lstStyle/>
                     <a:p>
                       <a:pPr algn="ctr" latinLnBrk="1"/>
+                      <a:r>
+                        <a:rPr lang="en-US" altLang="ko-KR" sz="1600" dirty="0">
+                          <a:solidFill>
+                            <a:sysClr val="windowText" lastClr="000000"/>
+                          </a:solidFill>
+                        </a:rPr>
+                        <a:t>18+1</a:t>
+                      </a:r>
                       <a:endParaRPr lang="ko-KR" altLang="en-US" sz="1600" dirty="0">
                         <a:solidFill>
                           <a:sysClr val="windowText" lastClr="000000"/>
@@ -22680,6 +22917,14 @@
                     <a:lstStyle/>
                     <a:p>
                       <a:pPr algn="ctr" latinLnBrk="1"/>
+                      <a:r>
+                        <a:rPr lang="en-US" altLang="ko-KR" sz="1600" dirty="0">
+                          <a:solidFill>
+                            <a:sysClr val="windowText" lastClr="000000"/>
+                          </a:solidFill>
+                        </a:rPr>
+                        <a:t>9+1</a:t>
+                      </a:r>
                       <a:endParaRPr lang="ko-KR" altLang="en-US" sz="1600" dirty="0">
                         <a:solidFill>
                           <a:sysClr val="windowText" lastClr="000000"/>
@@ -22746,6 +22991,14 @@
                     <a:lstStyle/>
                     <a:p>
                       <a:pPr algn="ctr" latinLnBrk="1"/>
+                      <a:r>
+                        <a:rPr lang="en-US" altLang="ko-KR" sz="1600" dirty="0">
+                          <a:solidFill>
+                            <a:sysClr val="windowText" lastClr="000000"/>
+                          </a:solidFill>
+                        </a:rPr>
+                        <a:t>6+3</a:t>
+                      </a:r>
                       <a:endParaRPr lang="ko-KR" altLang="en-US" sz="1600" dirty="0">
                         <a:solidFill>
                           <a:sysClr val="windowText" lastClr="000000"/>
@@ -22812,6 +23065,14 @@
                     <a:lstStyle/>
                     <a:p>
                       <a:pPr algn="ctr" latinLnBrk="1"/>
+                      <a:r>
+                        <a:rPr lang="en-US" altLang="ko-KR" sz="1600" dirty="0">
+                          <a:solidFill>
+                            <a:sysClr val="windowText" lastClr="000000"/>
+                          </a:solidFill>
+                        </a:rPr>
+                        <a:t>6</a:t>
+                      </a:r>
                       <a:endParaRPr lang="ko-KR" altLang="en-US" sz="1600" dirty="0">
                         <a:solidFill>
                           <a:sysClr val="windowText" lastClr="000000"/>
@@ -22878,6 +23139,14 @@
                     <a:lstStyle/>
                     <a:p>
                       <a:pPr algn="ctr" latinLnBrk="1"/>
+                      <a:r>
+                        <a:rPr lang="en-US" altLang="ko-KR" sz="1600" dirty="0">
+                          <a:solidFill>
+                            <a:sysClr val="windowText" lastClr="000000"/>
+                          </a:solidFill>
+                        </a:rPr>
+                        <a:t>6</a:t>
+                      </a:r>
                       <a:endParaRPr lang="ko-KR" altLang="en-US" sz="1600" dirty="0">
                         <a:solidFill>
                           <a:sysClr val="windowText" lastClr="000000"/>
@@ -22944,6 +23213,14 @@
                     <a:lstStyle/>
                     <a:p>
                       <a:pPr algn="ctr" latinLnBrk="1"/>
+                      <a:r>
+                        <a:rPr lang="en-US" altLang="ko-KR" sz="1600" dirty="0">
+                          <a:solidFill>
+                            <a:sysClr val="windowText" lastClr="000000"/>
+                          </a:solidFill>
+                        </a:rPr>
+                        <a:t>6</a:t>
+                      </a:r>
                       <a:endParaRPr lang="ko-KR" altLang="en-US" sz="1600" dirty="0">
                         <a:solidFill>
                           <a:sysClr val="windowText" lastClr="000000"/>
@@ -23010,6 +23287,14 @@
                     <a:lstStyle/>
                     <a:p>
                       <a:pPr algn="ctr" latinLnBrk="1"/>
+                      <a:r>
+                        <a:rPr lang="en-US" altLang="ko-KR" sz="1600" dirty="0">
+                          <a:solidFill>
+                            <a:sysClr val="windowText" lastClr="000000"/>
+                          </a:solidFill>
+                        </a:rPr>
+                        <a:t>6</a:t>
+                      </a:r>
                       <a:endParaRPr lang="ko-KR" altLang="en-US" sz="1600" dirty="0">
                         <a:solidFill>
                           <a:sysClr val="windowText" lastClr="000000"/>
@@ -23076,6 +23361,88 @@
                     <a:lstStyle/>
                     <a:p>
                       <a:pPr algn="ctr" latinLnBrk="1"/>
+                      <a:r>
+                        <a:rPr lang="en-US" altLang="ko-KR" sz="1600" dirty="0">
+                          <a:solidFill>
+                            <a:sysClr val="windowText" lastClr="000000"/>
+                          </a:solidFill>
+                        </a:rPr>
+                        <a:t>6</a:t>
+                      </a:r>
+                      <a:endParaRPr lang="ko-KR" altLang="en-US" sz="1600" dirty="0">
+                        <a:solidFill>
+                          <a:sysClr val="windowText" lastClr="000000"/>
+                        </a:solidFill>
+                      </a:endParaRPr>
+                    </a:p>
+                  </a:txBody>
+                  <a:tcPr anchor="ctr">
+                    <a:lnL w="12700" cap="flat" cmpd="sng" algn="ctr">
+                      <a:solidFill>
+                        <a:schemeClr val="tx1"/>
+                      </a:solidFill>
+                      <a:prstDash val="solid"/>
+                      <a:round/>
+                      <a:headEnd type="none" w="med" len="med"/>
+                      <a:tailEnd type="none" w="med" len="med"/>
+                    </a:lnL>
+                    <a:lnR w="12700" cap="flat" cmpd="sng" algn="ctr">
+                      <a:solidFill>
+                        <a:schemeClr val="tx1"/>
+                      </a:solidFill>
+                      <a:prstDash val="solid"/>
+                      <a:round/>
+                      <a:headEnd type="none" w="med" len="med"/>
+                      <a:tailEnd type="none" w="med" len="med"/>
+                    </a:lnR>
+                    <a:lnT w="12700" cap="flat" cmpd="sng" algn="ctr">
+                      <a:solidFill>
+                        <a:schemeClr val="tx1"/>
+                      </a:solidFill>
+                      <a:prstDash val="solid"/>
+                      <a:round/>
+                      <a:headEnd type="none" w="med" len="med"/>
+                      <a:tailEnd type="none" w="med" len="med"/>
+                    </a:lnT>
+                    <a:lnB w="12700" cap="flat" cmpd="sng" algn="ctr">
+                      <a:solidFill>
+                        <a:schemeClr val="tx1"/>
+                      </a:solidFill>
+                      <a:prstDash val="solid"/>
+                      <a:round/>
+                      <a:headEnd type="none" w="med" len="med"/>
+                      <a:tailEnd type="none" w="med" len="med"/>
+                    </a:lnB>
+                    <a:lnTlToBr w="12700" cmpd="sng">
+                      <a:noFill/>
+                      <a:prstDash val="solid"/>
+                    </a:lnTlToBr>
+                    <a:lnBlToTr w="12700" cmpd="sng">
+                      <a:noFill/>
+                      <a:prstDash val="solid"/>
+                    </a:lnBlToTr>
+                    <a:solidFill>
+                      <a:schemeClr val="accent2">
+                        <a:lumMod val="20000"/>
+                        <a:lumOff val="80000"/>
+                      </a:schemeClr>
+                    </a:solidFill>
+                  </a:tcPr>
+                </a:tc>
+                <a:tc>
+                  <a:txBody>
+                    <a:bodyPr/>
+                    <a:lstStyle/>
+                    <a:p>
+                      <a:pPr algn="ctr" latinLnBrk="1"/>
+                      <a:r>
+                        <a:rPr lang="en-US" altLang="ko-KR" sz="1600" dirty="0">
+                          <a:solidFill>
+                            <a:sysClr val="windowText" lastClr="000000"/>
+                          </a:solidFill>
+                        </a:rPr>
+                        <a:t>6</a:t>
+                      </a:r>
                       <a:endParaRPr lang="ko-KR" altLang="en-US" sz="1600" dirty="0">
                         <a:solidFill>
                           <a:sysClr val="windowText" lastClr="000000"/>
@@ -24076,6 +24443,71 @@
                         </a:rPr>
                         <a:t>6</a:t>
                       </a:r>
+                      <a:endParaRPr lang="ko-KR" altLang="en-US" sz="1600" dirty="0">
+                        <a:solidFill>
+                          <a:sysClr val="windowText" lastClr="000000"/>
+                        </a:solidFill>
+                      </a:endParaRPr>
+                    </a:p>
+                  </a:txBody>
+                  <a:tcPr anchor="ctr">
+                    <a:lnL w="12700" cap="flat" cmpd="sng" algn="ctr">
+                      <a:solidFill>
+                        <a:schemeClr val="tx1"/>
+                      </a:solidFill>
+                      <a:prstDash val="solid"/>
+                      <a:round/>
+                      <a:headEnd type="none" w="med" len="med"/>
+                      <a:tailEnd type="none" w="med" len="med"/>
+                    </a:lnL>
+                    <a:lnR w="12700" cap="flat" cmpd="sng" algn="ctr">
+                      <a:solidFill>
+                        <a:schemeClr val="tx1"/>
+                      </a:solidFill>
+                      <a:prstDash val="solid"/>
+                      <a:round/>
+                      <a:headEnd type="none" w="med" len="med"/>
+                      <a:tailEnd type="none" w="med" len="med"/>
+                    </a:lnR>
+                    <a:lnT w="12700" cap="flat" cmpd="sng" algn="ctr">
+                      <a:solidFill>
+                        <a:schemeClr val="tx1"/>
+                      </a:solidFill>
+                      <a:prstDash val="solid"/>
+                      <a:round/>
+                      <a:headEnd type="none" w="med" len="med"/>
+                      <a:tailEnd type="none" w="med" len="med"/>
+                    </a:lnT>
+                    <a:lnB w="12700" cap="flat" cmpd="sng" algn="ctr">
+                      <a:solidFill>
+                        <a:schemeClr val="tx1"/>
+                      </a:solidFill>
+                      <a:prstDash val="solid"/>
+                      <a:round/>
+                      <a:headEnd type="none" w="med" len="med"/>
+                      <a:tailEnd type="none" w="med" len="med"/>
+                    </a:lnB>
+                    <a:lnTlToBr w="12700" cmpd="sng">
+                      <a:noFill/>
+                      <a:prstDash val="solid"/>
+                    </a:lnTlToBr>
+                    <a:lnBlToTr w="12700" cmpd="sng">
+                      <a:noFill/>
+                      <a:prstDash val="solid"/>
+                    </a:lnBlToTr>
+                    <a:solidFill>
+                      <a:schemeClr val="bg2">
+                        <a:lumMod val="50000"/>
+                      </a:schemeClr>
+                    </a:solidFill>
+                  </a:tcPr>
+                </a:tc>
+                <a:tc>
+                  <a:txBody>
+                    <a:bodyPr/>
+                    <a:lstStyle/>
+                    <a:p>
+                      <a:pPr algn="ctr" latinLnBrk="1"/>
                       <a:endParaRPr lang="ko-KR" altLang="en-US" sz="1600" dirty="0">
                         <a:solidFill>
                           <a:sysClr val="windowText" lastClr="000000"/>
@@ -25170,6 +25602,71 @@
                     <a:lstStyle/>
                     <a:p>
                       <a:pPr algn="ctr" latinLnBrk="1"/>
+                      <a:endParaRPr lang="en-US" altLang="ko-KR" sz="1600" dirty="0">
+                        <a:solidFill>
+                          <a:sysClr val="windowText" lastClr="000000"/>
+                        </a:solidFill>
+                      </a:endParaRPr>
+                    </a:p>
+                  </a:txBody>
+                  <a:tcPr anchor="ctr">
+                    <a:lnL w="12700" cap="flat" cmpd="sng" algn="ctr">
+                      <a:solidFill>
+                        <a:schemeClr val="tx1"/>
+                      </a:solidFill>
+                      <a:prstDash val="solid"/>
+                      <a:round/>
+                      <a:headEnd type="none" w="med" len="med"/>
+                      <a:tailEnd type="none" w="med" len="med"/>
+                    </a:lnL>
+                    <a:lnR w="12700" cap="flat" cmpd="sng" algn="ctr">
+                      <a:solidFill>
+                        <a:schemeClr val="tx1"/>
+                      </a:solidFill>
+                      <a:prstDash val="solid"/>
+                      <a:round/>
+                      <a:headEnd type="none" w="med" len="med"/>
+                      <a:tailEnd type="none" w="med" len="med"/>
+                    </a:lnR>
+                    <a:lnT w="12700" cap="flat" cmpd="sng" algn="ctr">
+                      <a:solidFill>
+                        <a:schemeClr val="tx1"/>
+                      </a:solidFill>
+                      <a:prstDash val="solid"/>
+                      <a:round/>
+                      <a:headEnd type="none" w="med" len="med"/>
+                      <a:tailEnd type="none" w="med" len="med"/>
+                    </a:lnT>
+                    <a:lnB w="12700" cap="flat" cmpd="sng" algn="ctr">
+                      <a:solidFill>
+                        <a:schemeClr val="tx1"/>
+                      </a:solidFill>
+                      <a:prstDash val="solid"/>
+                      <a:round/>
+                      <a:headEnd type="none" w="med" len="med"/>
+                      <a:tailEnd type="none" w="med" len="med"/>
+                    </a:lnB>
+                    <a:lnTlToBr w="12700" cmpd="sng">
+                      <a:noFill/>
+                      <a:prstDash val="solid"/>
+                    </a:lnTlToBr>
+                    <a:lnBlToTr w="12700" cmpd="sng">
+                      <a:noFill/>
+                      <a:prstDash val="solid"/>
+                    </a:lnBlToTr>
+                    <a:solidFill>
+                      <a:schemeClr val="bg2">
+                        <a:lumMod val="50000"/>
+                      </a:schemeClr>
+                    </a:solidFill>
+                  </a:tcPr>
+                </a:tc>
+                <a:tc>
+                  <a:txBody>
+                    <a:bodyPr/>
+                    <a:lstStyle/>
+                    <a:p>
+                      <a:pPr algn="ctr" latinLnBrk="1"/>
                       <a:r>
                         <a:rPr lang="en-US" altLang="ko-KR" sz="1600" dirty="0">
                           <a:solidFill>
@@ -26119,6 +26616,72 @@
                         </a:rPr>
                         <a:t>19</a:t>
                       </a:r>
+                      <a:endParaRPr lang="ko-KR" altLang="en-US" sz="1600" dirty="0">
+                        <a:solidFill>
+                          <a:sysClr val="windowText" lastClr="000000"/>
+                        </a:solidFill>
+                      </a:endParaRPr>
+                    </a:p>
+                  </a:txBody>
+                  <a:tcPr anchor="ctr">
+                    <a:lnL w="12700" cap="flat" cmpd="sng" algn="ctr">
+                      <a:solidFill>
+                        <a:schemeClr val="tx1"/>
+                      </a:solidFill>
+                      <a:prstDash val="solid"/>
+                      <a:round/>
+                      <a:headEnd type="none" w="med" len="med"/>
+                      <a:tailEnd type="none" w="med" len="med"/>
+                    </a:lnL>
+                    <a:lnR w="12700" cap="flat" cmpd="sng" algn="ctr">
+                      <a:solidFill>
+                        <a:schemeClr val="tx1"/>
+                      </a:solidFill>
+                      <a:prstDash val="solid"/>
+                      <a:round/>
+                      <a:headEnd type="none" w="med" len="med"/>
+                      <a:tailEnd type="none" w="med" len="med"/>
+                    </a:lnR>
+                    <a:lnT w="12700" cap="flat" cmpd="sng" algn="ctr">
+                      <a:solidFill>
+                        <a:schemeClr val="tx1"/>
+                      </a:solidFill>
+                      <a:prstDash val="solid"/>
+                      <a:round/>
+                      <a:headEnd type="none" w="med" len="med"/>
+                      <a:tailEnd type="none" w="med" len="med"/>
+                    </a:lnT>
+                    <a:lnB w="12700" cap="flat" cmpd="sng" algn="ctr">
+                      <a:solidFill>
+                        <a:schemeClr val="tx1"/>
+                      </a:solidFill>
+                      <a:prstDash val="solid"/>
+                      <a:round/>
+                      <a:headEnd type="none" w="med" len="med"/>
+                      <a:tailEnd type="none" w="med" len="med"/>
+                    </a:lnB>
+                    <a:lnTlToBr w="12700" cmpd="sng">
+                      <a:noFill/>
+                      <a:prstDash val="solid"/>
+                    </a:lnTlToBr>
+                    <a:lnBlToTr w="12700" cmpd="sng">
+                      <a:noFill/>
+                      <a:prstDash val="solid"/>
+                    </a:lnBlToTr>
+                    <a:solidFill>
+                      <a:schemeClr val="accent2">
+                        <a:lumMod val="20000"/>
+                        <a:lumOff val="80000"/>
+                      </a:schemeClr>
+                    </a:solidFill>
+                  </a:tcPr>
+                </a:tc>
+                <a:tc>
+                  <a:txBody>
+                    <a:bodyPr/>
+                    <a:lstStyle/>
+                    <a:p>
+                      <a:pPr algn="ctr" latinLnBrk="1"/>
                       <a:endParaRPr lang="ko-KR" altLang="en-US" sz="1600" dirty="0">
                         <a:solidFill>
                           <a:sysClr val="windowText" lastClr="000000"/>

</xml_diff>